<commit_message>
Update DG Architecture and Logic diagram
</commit_message>
<xml_diff>
--- a/docs/diagrams/ArchitectureDiagram.pptx
+++ b/docs/diagrams/ArchitectureDiagram.pptx
@@ -208,7 +208,7 @@
           <a:p>
             <a:fld id="{F5CC4B3F-88C1-4FFA-B1B6-F41C21DC6924}" type="datetimeFigureOut">
               <a:rPr lang="en-US" smtClean="0"/>
-              <a:t>12/15/2018</a:t>
+              <a:t>3/6/2019</a:t>
             </a:fld>
             <a:endParaRPr lang="en-US"/>
           </a:p>
@@ -654,7 +654,7 @@
           <a:p>
             <a:fld id="{78C97017-6FC3-485B-9764-EAC9E56C1D49}" type="datetimeFigureOut">
               <a:rPr lang="en-US" smtClean="0"/>
-              <a:t>12/15/2018</a:t>
+              <a:t>3/6/2019</a:t>
             </a:fld>
             <a:endParaRPr lang="en-US"/>
           </a:p>
@@ -822,7 +822,7 @@
           <a:p>
             <a:fld id="{78C97017-6FC3-485B-9764-EAC9E56C1D49}" type="datetimeFigureOut">
               <a:rPr lang="en-US" smtClean="0"/>
-              <a:t>12/15/2018</a:t>
+              <a:t>3/6/2019</a:t>
             </a:fld>
             <a:endParaRPr lang="en-US"/>
           </a:p>
@@ -1000,7 +1000,7 @@
           <a:p>
             <a:fld id="{78C97017-6FC3-485B-9764-EAC9E56C1D49}" type="datetimeFigureOut">
               <a:rPr lang="en-US" smtClean="0"/>
-              <a:t>12/15/2018</a:t>
+              <a:t>3/6/2019</a:t>
             </a:fld>
             <a:endParaRPr lang="en-US"/>
           </a:p>
@@ -1168,7 +1168,7 @@
           <a:p>
             <a:fld id="{78C97017-6FC3-485B-9764-EAC9E56C1D49}" type="datetimeFigureOut">
               <a:rPr lang="en-US" smtClean="0"/>
-              <a:t>12/15/2018</a:t>
+              <a:t>3/6/2019</a:t>
             </a:fld>
             <a:endParaRPr lang="en-US"/>
           </a:p>
@@ -1413,7 +1413,7 @@
           <a:p>
             <a:fld id="{78C97017-6FC3-485B-9764-EAC9E56C1D49}" type="datetimeFigureOut">
               <a:rPr lang="en-US" smtClean="0"/>
-              <a:t>12/15/2018</a:t>
+              <a:t>3/6/2019</a:t>
             </a:fld>
             <a:endParaRPr lang="en-US"/>
           </a:p>
@@ -1698,7 +1698,7 @@
           <a:p>
             <a:fld id="{78C97017-6FC3-485B-9764-EAC9E56C1D49}" type="datetimeFigureOut">
               <a:rPr lang="en-US" smtClean="0"/>
-              <a:t>12/15/2018</a:t>
+              <a:t>3/6/2019</a:t>
             </a:fld>
             <a:endParaRPr lang="en-US"/>
           </a:p>
@@ -2117,7 +2117,7 @@
           <a:p>
             <a:fld id="{78C97017-6FC3-485B-9764-EAC9E56C1D49}" type="datetimeFigureOut">
               <a:rPr lang="en-US" smtClean="0"/>
-              <a:t>12/15/2018</a:t>
+              <a:t>3/6/2019</a:t>
             </a:fld>
             <a:endParaRPr lang="en-US"/>
           </a:p>
@@ -2234,7 +2234,7 @@
           <a:p>
             <a:fld id="{78C97017-6FC3-485B-9764-EAC9E56C1D49}" type="datetimeFigureOut">
               <a:rPr lang="en-US" smtClean="0"/>
-              <a:t>12/15/2018</a:t>
+              <a:t>3/6/2019</a:t>
             </a:fld>
             <a:endParaRPr lang="en-US"/>
           </a:p>
@@ -2329,7 +2329,7 @@
           <a:p>
             <a:fld id="{78C97017-6FC3-485B-9764-EAC9E56C1D49}" type="datetimeFigureOut">
               <a:rPr lang="en-US" smtClean="0"/>
-              <a:t>12/15/2018</a:t>
+              <a:t>3/6/2019</a:t>
             </a:fld>
             <a:endParaRPr lang="en-US"/>
           </a:p>
@@ -2604,7 +2604,7 @@
           <a:p>
             <a:fld id="{78C97017-6FC3-485B-9764-EAC9E56C1D49}" type="datetimeFigureOut">
               <a:rPr lang="en-US" smtClean="0"/>
-              <a:t>12/15/2018</a:t>
+              <a:t>3/6/2019</a:t>
             </a:fld>
             <a:endParaRPr lang="en-US"/>
           </a:p>
@@ -2856,7 +2856,7 @@
           <a:p>
             <a:fld id="{78C97017-6FC3-485B-9764-EAC9E56C1D49}" type="datetimeFigureOut">
               <a:rPr lang="en-US" smtClean="0"/>
-              <a:t>12/15/2018</a:t>
+              <a:t>3/6/2019</a:t>
             </a:fld>
             <a:endParaRPr lang="en-US"/>
           </a:p>
@@ -3067,7 +3067,7 @@
           <a:p>
             <a:fld id="{78C97017-6FC3-485B-9764-EAC9E56C1D49}" type="datetimeFigureOut">
               <a:rPr lang="en-US" smtClean="0"/>
-              <a:t>12/15/2018</a:t>
+              <a:t>3/6/2019</a:t>
             </a:fld>
             <a:endParaRPr lang="en-US"/>
           </a:p>
@@ -3450,8 +3450,8 @@
         </p:nvSpPr>
         <p:spPr>
           <a:xfrm>
-            <a:off x="1636188" y="2057400"/>
-            <a:ext cx="5700181" cy="2667000"/>
+            <a:off x="990600" y="1828800"/>
+            <a:ext cx="5715000" cy="3505196"/>
           </a:xfrm>
           <a:prstGeom prst="roundRect">
             <a:avLst>
@@ -3504,8 +3504,8 @@
         </p:nvSpPr>
         <p:spPr>
           <a:xfrm flipH="1">
-            <a:off x="1964269" y="2191178"/>
-            <a:ext cx="609602" cy="1294917"/>
+            <a:off x="1318681" y="2057402"/>
+            <a:ext cx="609602" cy="2028237"/>
           </a:xfrm>
           <a:prstGeom prst="roundRect">
             <a:avLst/>
@@ -3563,7 +3563,7 @@
         </p:nvSpPr>
         <p:spPr>
           <a:xfrm>
-            <a:off x="3412069" y="2191178"/>
+            <a:off x="2766481" y="2828876"/>
             <a:ext cx="1295400" cy="552022"/>
           </a:xfrm>
           <a:prstGeom prst="roundRect">
@@ -3622,7 +3622,7 @@
         </p:nvSpPr>
         <p:spPr>
           <a:xfrm>
-            <a:off x="5164669" y="2191179"/>
+            <a:off x="4588928" y="2831063"/>
             <a:ext cx="1447800" cy="552022"/>
           </a:xfrm>
           <a:prstGeom prst="roundRect">
@@ -3685,8 +3685,8 @@
         </p:nvSpPr>
         <p:spPr>
           <a:xfrm>
-            <a:off x="3412069" y="3124200"/>
-            <a:ext cx="1295400" cy="723791"/>
+            <a:off x="2766481" y="3685698"/>
+            <a:ext cx="1295400" cy="550800"/>
           </a:xfrm>
           <a:prstGeom prst="roundRect">
             <a:avLst/>
@@ -3736,80 +3736,18 @@
           </a:p>
         </p:txBody>
       </p:sp>
-      <p:sp>
-        <p:nvSpPr>
-          <p:cNvPr id="8" name="Rectangle 45"/>
-          <p:cNvSpPr/>
-          <p:nvPr/>
-        </p:nvSpPr>
-        <p:spPr>
-          <a:xfrm>
-            <a:off x="3217846" y="4131994"/>
-            <a:ext cx="2658531" cy="444640"/>
-          </a:xfrm>
-          <a:prstGeom prst="roundRect">
-            <a:avLst/>
-          </a:prstGeom>
-          <a:solidFill>
-            <a:schemeClr val="accent5">
-              <a:lumMod val="75000"/>
-            </a:schemeClr>
-          </a:solidFill>
-          <a:ln w="19050">
-            <a:solidFill>
-              <a:schemeClr val="accent5">
-                <a:lumMod val="75000"/>
-              </a:schemeClr>
-            </a:solidFill>
-          </a:ln>
-          <a:effectLst/>
-        </p:spPr>
-        <p:style>
-          <a:lnRef idx="1">
-            <a:schemeClr val="accent5"/>
-          </a:lnRef>
-          <a:fillRef idx="2">
-            <a:schemeClr val="accent5"/>
-          </a:fillRef>
-          <a:effectRef idx="1">
-            <a:schemeClr val="accent5"/>
-          </a:effectRef>
-          <a:fontRef idx="minor">
-            <a:schemeClr val="dk1"/>
-          </a:fontRef>
-        </p:style>
-        <p:txBody>
-          <a:bodyPr rtlCol="0" anchor="ctr"/>
-          <a:lstStyle/>
-          <a:p>
-            <a:pPr algn="ctr"/>
-            <a:r>
-              <a:rPr lang="en-US" sz="1400" dirty="0">
-                <a:solidFill>
-                  <a:schemeClr val="bg1"/>
-                </a:solidFill>
-              </a:rPr>
-              <a:t>Commons</a:t>
-            </a:r>
-            <a:endParaRPr lang="en-SG" sz="1400" dirty="0">
-              <a:solidFill>
-                <a:schemeClr val="bg1"/>
-              </a:solidFill>
-            </a:endParaRPr>
-          </a:p>
-        </p:txBody>
-      </p:sp>
       <p:cxnSp>
         <p:nvCxnSpPr>
           <p:cNvPr id="10" name="Straight Arrow Connector 9"/>
           <p:cNvCxnSpPr>
+            <a:cxnSpLocks/>
             <a:endCxn id="3" idx="1"/>
           </p:cNvCxnSpPr>
           <p:nvPr/>
         </p:nvCxnSpPr>
         <p:spPr>
           <a:xfrm>
-            <a:off x="2573871" y="2467189"/>
+            <a:off x="1928283" y="3104887"/>
             <a:ext cx="838198" cy="0"/>
           </a:xfrm>
           <a:prstGeom prst="straightConnector1">
@@ -3845,7 +3783,7 @@
         </p:nvCxnSpPr>
         <p:spPr>
           <a:xfrm>
-            <a:off x="2569639" y="3276600"/>
+            <a:off x="1928283" y="3810000"/>
             <a:ext cx="838198" cy="0"/>
           </a:xfrm>
           <a:prstGeom prst="straightConnector1">
@@ -3877,6 +3815,7 @@
         <p:nvCxnSpPr>
           <p:cNvPr id="13" name="Straight Arrow Connector 12"/>
           <p:cNvCxnSpPr>
+            <a:cxnSpLocks/>
             <a:stCxn id="3" idx="2"/>
             <a:endCxn id="5" idx="0"/>
           </p:cNvCxnSpPr>
@@ -3884,8 +3823,8 @@
         </p:nvCxnSpPr>
         <p:spPr>
           <a:xfrm>
-            <a:off x="4059769" y="2743200"/>
-            <a:ext cx="0" cy="381000"/>
+            <a:off x="3414181" y="3380898"/>
+            <a:ext cx="0" cy="304800"/>
           </a:xfrm>
           <a:prstGeom prst="straightConnector1">
             <a:avLst/>
@@ -3915,13 +3854,17 @@
       <p:cxnSp>
         <p:nvCxnSpPr>
           <p:cNvPr id="16" name="Straight Arrow Connector 15"/>
-          <p:cNvCxnSpPr/>
+          <p:cNvCxnSpPr>
+            <a:cxnSpLocks/>
+            <a:stCxn id="3" idx="3"/>
+            <a:endCxn id="4" idx="1"/>
+          </p:cNvCxnSpPr>
           <p:nvPr/>
         </p:nvCxnSpPr>
         <p:spPr>
           <a:xfrm>
-            <a:off x="4707469" y="2467189"/>
-            <a:ext cx="457200" cy="0"/>
+            <a:off x="4061881" y="3104887"/>
+            <a:ext cx="527047" cy="2187"/>
           </a:xfrm>
           <a:prstGeom prst="straightConnector1">
             <a:avLst/>
@@ -3948,226 +3891,270 @@
           </a:fontRef>
         </p:style>
       </p:cxnSp>
-      <p:sp>
-        <p:nvSpPr>
-          <p:cNvPr id="29" name="Smiley Face 28"/>
-          <p:cNvSpPr/>
+      <p:grpSp>
+        <p:nvGrpSpPr>
+          <p:cNvPr id="73" name="user">
+            <a:extLst>
+              <a:ext uri="{FF2B5EF4-FFF2-40B4-BE49-F238E27FC236}">
+                <a16:creationId xmlns:a16="http://schemas.microsoft.com/office/drawing/2014/main" id="{4D33FB97-0E2A-4EAC-BB77-56499816FB15}"/>
+              </a:ext>
+            </a:extLst>
+          </p:cNvPr>
+          <p:cNvGrpSpPr/>
           <p:nvPr/>
-        </p:nvSpPr>
-        <p:spPr>
+        </p:nvGrpSpPr>
+        <p:grpSpPr>
           <a:xfrm>
-            <a:off x="1202269" y="2743200"/>
-            <a:ext cx="381000" cy="381000"/>
+            <a:off x="532678" y="2961798"/>
+            <a:ext cx="706969" cy="381000"/>
+            <a:chOff x="328081" y="2667001"/>
+            <a:chExt cx="706969" cy="381000"/>
           </a:xfrm>
-          <a:prstGeom prst="smileyFace">
-            <a:avLst/>
-          </a:prstGeom>
-          <a:solidFill>
-            <a:schemeClr val="bg1"/>
-          </a:solidFill>
-          <a:ln>
+        </p:grpSpPr>
+        <p:sp>
+          <p:nvSpPr>
+            <p:cNvPr id="29" name="Smiley Face 28"/>
+            <p:cNvSpPr/>
+            <p:nvPr/>
+          </p:nvSpPr>
+          <p:spPr>
+            <a:xfrm>
+              <a:off x="328081" y="2667001"/>
+              <a:ext cx="381000" cy="381000"/>
+            </a:xfrm>
+            <a:prstGeom prst="smileyFace">
+              <a:avLst/>
+            </a:prstGeom>
             <a:solidFill>
+              <a:schemeClr val="bg1"/>
+            </a:solidFill>
+            <a:ln>
+              <a:solidFill>
+                <a:schemeClr val="tx1"/>
+              </a:solidFill>
+            </a:ln>
+          </p:spPr>
+          <p:style>
+            <a:lnRef idx="2">
+              <a:schemeClr val="accent1">
+                <a:shade val="50000"/>
+              </a:schemeClr>
+            </a:lnRef>
+            <a:fillRef idx="1">
+              <a:schemeClr val="accent1"/>
+            </a:fillRef>
+            <a:effectRef idx="0">
+              <a:schemeClr val="accent1"/>
+            </a:effectRef>
+            <a:fontRef idx="minor">
+              <a:schemeClr val="lt1"/>
+            </a:fontRef>
+          </p:style>
+          <p:txBody>
+            <a:bodyPr rtlCol="0" anchor="ctr"/>
+            <a:lstStyle/>
+            <a:p>
+              <a:pPr algn="ctr"/>
+              <a:endParaRPr lang="en-US"/>
+            </a:p>
+          </p:txBody>
+        </p:sp>
+        <p:cxnSp>
+          <p:nvCxnSpPr>
+            <p:cNvPr id="32" name="Straight Arrow Connector 31"/>
+            <p:cNvCxnSpPr/>
+            <p:nvPr/>
+          </p:nvCxnSpPr>
+          <p:spPr>
+            <a:xfrm flipV="1">
+              <a:off x="762000" y="2863797"/>
+              <a:ext cx="273050" cy="1"/>
+            </a:xfrm>
+            <a:prstGeom prst="straightConnector1">
+              <a:avLst/>
+            </a:prstGeom>
+            <a:ln w="28575">
+              <a:solidFill>
+                <a:schemeClr val="tx1"/>
+              </a:solidFill>
+              <a:prstDash val="sysDot"/>
+              <a:tailEnd type="arrow"/>
+            </a:ln>
+          </p:spPr>
+          <p:style>
+            <a:lnRef idx="1">
+              <a:schemeClr val="accent1"/>
+            </a:lnRef>
+            <a:fillRef idx="0">
+              <a:schemeClr val="accent1"/>
+            </a:fillRef>
+            <a:effectRef idx="0">
+              <a:schemeClr val="accent1"/>
+            </a:effectRef>
+            <a:fontRef idx="minor">
               <a:schemeClr val="tx1"/>
+            </a:fontRef>
+          </p:style>
+        </p:cxnSp>
+      </p:grpSp>
+      <p:grpSp>
+        <p:nvGrpSpPr>
+          <p:cNvPr id="86" name="Group 85">
+            <a:extLst>
+              <a:ext uri="{FF2B5EF4-FFF2-40B4-BE49-F238E27FC236}">
+                <a16:creationId xmlns:a16="http://schemas.microsoft.com/office/drawing/2014/main" id="{3C2ADF2B-9F56-49E1-9858-25D98BE44CEA}"/>
+              </a:ext>
+            </a:extLst>
+          </p:cNvPr>
+          <p:cNvGrpSpPr/>
+          <p:nvPr/>
+        </p:nvGrpSpPr>
+        <p:grpSpPr>
+          <a:xfrm>
+            <a:off x="6036728" y="2876287"/>
+            <a:ext cx="1507072" cy="457200"/>
+            <a:chOff x="6218754" y="2876287"/>
+            <a:chExt cx="1507072" cy="457200"/>
+          </a:xfrm>
+        </p:grpSpPr>
+        <p:cxnSp>
+          <p:nvCxnSpPr>
+            <p:cNvPr id="34" name="Straight Arrow Connector 33"/>
+            <p:cNvCxnSpPr>
+              <a:cxnSpLocks/>
+            </p:cNvCxnSpPr>
+            <p:nvPr/>
+          </p:nvCxnSpPr>
+          <p:spPr>
+            <a:xfrm>
+              <a:off x="6218754" y="3104887"/>
+              <a:ext cx="944046" cy="2187"/>
+            </a:xfrm>
+            <a:prstGeom prst="straightConnector1">
+              <a:avLst/>
+            </a:prstGeom>
+            <a:ln w="28575">
+              <a:solidFill>
+                <a:schemeClr val="accent6">
+                  <a:lumMod val="75000"/>
+                </a:schemeClr>
+              </a:solidFill>
+              <a:prstDash val="sysDot"/>
+              <a:tailEnd type="arrow"/>
+            </a:ln>
+          </p:spPr>
+          <p:style>
+            <a:lnRef idx="1">
+              <a:schemeClr val="accent1"/>
+            </a:lnRef>
+            <a:fillRef idx="0">
+              <a:schemeClr val="accent1"/>
+            </a:fillRef>
+            <a:effectRef idx="0">
+              <a:schemeClr val="accent1"/>
+            </a:effectRef>
+            <a:fontRef idx="minor">
+              <a:schemeClr val="tx1"/>
+            </a:fontRef>
+          </p:style>
+        </p:cxnSp>
+        <p:sp>
+          <p:nvSpPr>
+            <p:cNvPr id="35" name="Folded Corner 34"/>
+            <p:cNvSpPr/>
+            <p:nvPr/>
+          </p:nvSpPr>
+          <p:spPr>
+            <a:xfrm>
+              <a:off x="7251695" y="2876287"/>
+              <a:ext cx="381000" cy="381000"/>
+            </a:xfrm>
+            <a:prstGeom prst="foldedCorner">
+              <a:avLst/>
+            </a:prstGeom>
+            <a:solidFill>
+              <a:schemeClr val="bg1"/>
             </a:solidFill>
-          </a:ln>
-        </p:spPr>
-        <p:style>
-          <a:lnRef idx="2">
-            <a:schemeClr val="accent1">
-              <a:shade val="50000"/>
-            </a:schemeClr>
-          </a:lnRef>
-          <a:fillRef idx="1">
-            <a:schemeClr val="accent1"/>
-          </a:fillRef>
-          <a:effectRef idx="0">
-            <a:schemeClr val="accent1"/>
-          </a:effectRef>
-          <a:fontRef idx="minor">
-            <a:schemeClr val="lt1"/>
-          </a:fontRef>
-        </p:style>
-        <p:txBody>
-          <a:bodyPr rtlCol="0" anchor="ctr"/>
-          <a:lstStyle/>
-          <a:p>
-            <a:pPr algn="ctr"/>
-            <a:endParaRPr lang="en-US"/>
-          </a:p>
-        </p:txBody>
-      </p:sp>
-      <p:cxnSp>
-        <p:nvCxnSpPr>
-          <p:cNvPr id="32" name="Straight Arrow Connector 31"/>
-          <p:cNvCxnSpPr/>
-          <p:nvPr/>
-        </p:nvCxnSpPr>
-        <p:spPr>
-          <a:xfrm flipV="1">
-            <a:off x="1636188" y="2939996"/>
-            <a:ext cx="273050" cy="1"/>
-          </a:xfrm>
-          <a:prstGeom prst="straightConnector1">
-            <a:avLst/>
-          </a:prstGeom>
-          <a:ln w="28575">
+            <a:ln>
+              <a:solidFill>
+                <a:schemeClr val="tx1"/>
+              </a:solidFill>
+            </a:ln>
+          </p:spPr>
+          <p:style>
+            <a:lnRef idx="2">
+              <a:schemeClr val="accent1">
+                <a:shade val="50000"/>
+              </a:schemeClr>
+            </a:lnRef>
+            <a:fillRef idx="1">
+              <a:schemeClr val="accent1"/>
+            </a:fillRef>
+            <a:effectRef idx="0">
+              <a:schemeClr val="accent1"/>
+            </a:effectRef>
+            <a:fontRef idx="minor">
+              <a:schemeClr val="lt1"/>
+            </a:fontRef>
+          </p:style>
+          <p:txBody>
+            <a:bodyPr rtlCol="0" anchor="ctr"/>
+            <a:lstStyle/>
+            <a:p>
+              <a:pPr algn="ctr"/>
+              <a:endParaRPr lang="en-US"/>
+            </a:p>
+          </p:txBody>
+        </p:sp>
+        <p:sp>
+          <p:nvSpPr>
+            <p:cNvPr id="36" name="Folded Corner 35"/>
+            <p:cNvSpPr/>
+            <p:nvPr/>
+          </p:nvSpPr>
+          <p:spPr>
+            <a:xfrm>
+              <a:off x="7344826" y="2952487"/>
+              <a:ext cx="381000" cy="381000"/>
+            </a:xfrm>
+            <a:prstGeom prst="foldedCorner">
+              <a:avLst/>
+            </a:prstGeom>
             <a:solidFill>
-              <a:schemeClr val="tx1"/>
+              <a:schemeClr val="bg1"/>
             </a:solidFill>
-            <a:prstDash val="sysDot"/>
-            <a:tailEnd type="arrow"/>
-          </a:ln>
-        </p:spPr>
-        <p:style>
-          <a:lnRef idx="1">
-            <a:schemeClr val="accent1"/>
-          </a:lnRef>
-          <a:fillRef idx="0">
-            <a:schemeClr val="accent1"/>
-          </a:fillRef>
-          <a:effectRef idx="0">
-            <a:schemeClr val="accent1"/>
-          </a:effectRef>
-          <a:fontRef idx="minor">
-            <a:schemeClr val="tx1"/>
-          </a:fontRef>
-        </p:style>
-      </p:cxnSp>
-      <p:cxnSp>
-        <p:nvCxnSpPr>
-          <p:cNvPr id="34" name="Straight Arrow Connector 33"/>
-          <p:cNvCxnSpPr/>
-          <p:nvPr/>
-        </p:nvCxnSpPr>
-        <p:spPr>
-          <a:xfrm flipV="1">
-            <a:off x="6680199" y="2467190"/>
-            <a:ext cx="939801" cy="1"/>
-          </a:xfrm>
-          <a:prstGeom prst="straightConnector1">
-            <a:avLst/>
-          </a:prstGeom>
-          <a:ln w="28575">
-            <a:solidFill>
-              <a:schemeClr val="accent6">
-                <a:lumMod val="75000"/>
+            <a:ln>
+              <a:solidFill>
+                <a:schemeClr val="tx1"/>
+              </a:solidFill>
+            </a:ln>
+          </p:spPr>
+          <p:style>
+            <a:lnRef idx="2">
+              <a:schemeClr val="accent1">
+                <a:shade val="50000"/>
               </a:schemeClr>
-            </a:solidFill>
-            <a:prstDash val="sysDot"/>
-            <a:tailEnd type="arrow"/>
-          </a:ln>
-        </p:spPr>
-        <p:style>
-          <a:lnRef idx="1">
-            <a:schemeClr val="accent1"/>
-          </a:lnRef>
-          <a:fillRef idx="0">
-            <a:schemeClr val="accent1"/>
-          </a:fillRef>
-          <a:effectRef idx="0">
-            <a:schemeClr val="accent1"/>
-          </a:effectRef>
-          <a:fontRef idx="minor">
-            <a:schemeClr val="tx1"/>
-          </a:fontRef>
-        </p:style>
-      </p:cxnSp>
-      <p:sp>
-        <p:nvSpPr>
-          <p:cNvPr id="35" name="Folded Corner 34"/>
-          <p:cNvSpPr/>
-          <p:nvPr/>
-        </p:nvSpPr>
-        <p:spPr>
-          <a:xfrm>
-            <a:off x="7679269" y="2286000"/>
-            <a:ext cx="381000" cy="381000"/>
-          </a:xfrm>
-          <a:prstGeom prst="foldedCorner">
-            <a:avLst/>
-          </a:prstGeom>
-          <a:solidFill>
-            <a:schemeClr val="bg1"/>
-          </a:solidFill>
-          <a:ln>
-            <a:solidFill>
-              <a:schemeClr val="tx1"/>
-            </a:solidFill>
-          </a:ln>
-        </p:spPr>
-        <p:style>
-          <a:lnRef idx="2">
-            <a:schemeClr val="accent1">
-              <a:shade val="50000"/>
-            </a:schemeClr>
-          </a:lnRef>
-          <a:fillRef idx="1">
-            <a:schemeClr val="accent1"/>
-          </a:fillRef>
-          <a:effectRef idx="0">
-            <a:schemeClr val="accent1"/>
-          </a:effectRef>
-          <a:fontRef idx="minor">
-            <a:schemeClr val="lt1"/>
-          </a:fontRef>
-        </p:style>
-        <p:txBody>
-          <a:bodyPr rtlCol="0" anchor="ctr"/>
-          <a:lstStyle/>
-          <a:p>
-            <a:pPr algn="ctr"/>
-            <a:endParaRPr lang="en-US"/>
-          </a:p>
-        </p:txBody>
-      </p:sp>
-      <p:sp>
-        <p:nvSpPr>
-          <p:cNvPr id="36" name="Folded Corner 35"/>
-          <p:cNvSpPr/>
-          <p:nvPr/>
-        </p:nvSpPr>
-        <p:spPr>
-          <a:xfrm>
-            <a:off x="7772400" y="2362200"/>
-            <a:ext cx="381000" cy="381000"/>
-          </a:xfrm>
-          <a:prstGeom prst="foldedCorner">
-            <a:avLst/>
-          </a:prstGeom>
-          <a:solidFill>
-            <a:schemeClr val="bg1"/>
-          </a:solidFill>
-          <a:ln>
-            <a:solidFill>
-              <a:schemeClr val="tx1"/>
-            </a:solidFill>
-          </a:ln>
-        </p:spPr>
-        <p:style>
-          <a:lnRef idx="2">
-            <a:schemeClr val="accent1">
-              <a:shade val="50000"/>
-            </a:schemeClr>
-          </a:lnRef>
-          <a:fillRef idx="1">
-            <a:schemeClr val="accent1"/>
-          </a:fillRef>
-          <a:effectRef idx="0">
-            <a:schemeClr val="accent1"/>
-          </a:effectRef>
-          <a:fontRef idx="minor">
-            <a:schemeClr val="lt1"/>
-          </a:fontRef>
-        </p:style>
-        <p:txBody>
-          <a:bodyPr rtlCol="0" anchor="ctr"/>
-          <a:lstStyle/>
-          <a:p>
-            <a:pPr algn="ctr"/>
-            <a:endParaRPr lang="en-US"/>
-          </a:p>
-        </p:txBody>
-      </p:sp>
+            </a:lnRef>
+            <a:fillRef idx="1">
+              <a:schemeClr val="accent1"/>
+            </a:fillRef>
+            <a:effectRef idx="0">
+              <a:schemeClr val="accent1"/>
+            </a:effectRef>
+            <a:fontRef idx="minor">
+              <a:schemeClr val="lt1"/>
+            </a:fontRef>
+          </p:style>
+          <p:txBody>
+            <a:bodyPr rtlCol="0" anchor="ctr"/>
+            <a:lstStyle/>
+            <a:p>
+              <a:pPr algn="ctr"/>
+              <a:endParaRPr lang="en-US"/>
+            </a:p>
+          </p:txBody>
+        </p:sp>
+      </p:grpSp>
       <p:sp>
         <p:nvSpPr>
           <p:cNvPr id="51" name="Cloud 50"/>
@@ -4176,7 +4163,7 @@
         </p:nvSpPr>
         <p:spPr>
           <a:xfrm>
-            <a:off x="2650069" y="1447800"/>
+            <a:off x="2004481" y="1208072"/>
             <a:ext cx="914400" cy="533400"/>
           </a:xfrm>
           <a:prstGeom prst="cloud">
@@ -4227,6 +4214,7 @@
         <p:nvCxnSpPr>
           <p:cNvPr id="52" name="Elbow Connector 51"/>
           <p:cNvCxnSpPr>
+            <a:cxnSpLocks/>
             <a:stCxn id="2" idx="0"/>
             <a:endCxn id="51" idx="2"/>
           </p:cNvCxnSpPr>
@@ -4234,8 +4222,8 @@
         </p:nvCxnSpPr>
         <p:spPr>
           <a:xfrm rot="5400000" flipH="1" flipV="1">
-            <a:off x="2222648" y="1760922"/>
-            <a:ext cx="476678" cy="383835"/>
+            <a:off x="1524084" y="1574170"/>
+            <a:ext cx="582630" cy="383835"/>
           </a:xfrm>
           <a:prstGeom prst="bentConnector2">
             <a:avLst/>
@@ -4263,39 +4251,552 @@
           </a:fontRef>
         </p:style>
       </p:cxnSp>
-      <p:sp>
-        <p:nvSpPr>
-          <p:cNvPr id="23" name="Rectangle 62"/>
+      <p:grpSp>
+        <p:nvGrpSpPr>
+          <p:cNvPr id="79" name="main">
+            <a:extLst>
+              <a:ext uri="{FF2B5EF4-FFF2-40B4-BE49-F238E27FC236}">
+                <a16:creationId xmlns:a16="http://schemas.microsoft.com/office/drawing/2014/main" id="{7D3C291C-2B44-4C3E-B710-BB32E24879B1}"/>
+              </a:ext>
+            </a:extLst>
+          </p:cNvPr>
+          <p:cNvGrpSpPr/>
+          <p:nvPr/>
+        </p:nvGrpSpPr>
+        <p:grpSpPr>
+          <a:xfrm>
+            <a:off x="1318681" y="4249376"/>
+            <a:ext cx="1028701" cy="833306"/>
+            <a:chOff x="1318681" y="4410960"/>
+            <a:chExt cx="1028701" cy="833306"/>
+          </a:xfrm>
+        </p:grpSpPr>
+        <p:sp>
+          <p:nvSpPr>
+            <p:cNvPr id="23" name="Rectangle 62"/>
+            <p:cNvSpPr/>
+            <p:nvPr/>
+          </p:nvSpPr>
+          <p:spPr>
+            <a:xfrm flipH="1">
+              <a:off x="1318681" y="4673358"/>
+              <a:ext cx="778931" cy="570908"/>
+            </a:xfrm>
+            <a:prstGeom prst="roundRect">
+              <a:avLst/>
+            </a:prstGeom>
+            <a:solidFill>
+              <a:srgbClr val="C00000"/>
+            </a:solidFill>
+            <a:ln w="19050">
+              <a:solidFill>
+                <a:srgbClr val="C00000"/>
+              </a:solidFill>
+            </a:ln>
+            <a:effectLst/>
+          </p:spPr>
+          <p:style>
+            <a:lnRef idx="1">
+              <a:schemeClr val="accent2"/>
+            </a:lnRef>
+            <a:fillRef idx="2">
+              <a:schemeClr val="accent2"/>
+            </a:fillRef>
+            <a:effectRef idx="1">
+              <a:schemeClr val="accent2"/>
+            </a:effectRef>
+            <a:fontRef idx="minor">
+              <a:schemeClr val="dk1"/>
+            </a:fontRef>
+          </p:style>
+          <p:txBody>
+            <a:bodyPr rtlCol="0" anchor="ctr"/>
+            <a:lstStyle/>
+            <a:p>
+              <a:pPr algn="ctr"/>
+              <a:r>
+                <a:rPr lang="en-US" sz="1600" dirty="0">
+                  <a:solidFill>
+                    <a:schemeClr val="bg1"/>
+                  </a:solidFill>
+                </a:rPr>
+                <a:t>Main</a:t>
+              </a:r>
+              <a:endParaRPr lang="en-SG" sz="1600" dirty="0">
+                <a:solidFill>
+                  <a:schemeClr val="bg1"/>
+                </a:solidFill>
+              </a:endParaRPr>
+            </a:p>
+          </p:txBody>
+        </p:sp>
+        <p:cxnSp>
+          <p:nvCxnSpPr>
+            <p:cNvPr id="37" name="Straight Arrow Connector 36"/>
+            <p:cNvCxnSpPr>
+              <a:stCxn id="23" idx="1"/>
+            </p:cNvCxnSpPr>
+            <p:nvPr/>
+          </p:nvCxnSpPr>
+          <p:spPr>
+            <a:xfrm>
+              <a:off x="2097612" y="4958812"/>
+              <a:ext cx="249770" cy="0"/>
+            </a:xfrm>
+            <a:prstGeom prst="straightConnector1">
+              <a:avLst/>
+            </a:prstGeom>
+            <a:ln w="28575">
+              <a:solidFill>
+                <a:srgbClr val="C00000"/>
+              </a:solidFill>
+              <a:prstDash val="solid"/>
+              <a:tailEnd type="arrow"/>
+            </a:ln>
+          </p:spPr>
+          <p:style>
+            <a:lnRef idx="1">
+              <a:schemeClr val="accent1"/>
+            </a:lnRef>
+            <a:fillRef idx="0">
+              <a:schemeClr val="accent1"/>
+            </a:fillRef>
+            <a:effectRef idx="0">
+              <a:schemeClr val="accent1"/>
+            </a:effectRef>
+            <a:fontRef idx="minor">
+              <a:schemeClr val="tx1"/>
+            </a:fontRef>
+          </p:style>
+        </p:cxnSp>
+        <p:cxnSp>
+          <p:nvCxnSpPr>
+            <p:cNvPr id="38" name="Straight Arrow Connector 37"/>
+            <p:cNvCxnSpPr/>
+            <p:nvPr/>
+          </p:nvCxnSpPr>
+          <p:spPr>
+            <a:xfrm rot="13867188">
+              <a:off x="2097612" y="4468921"/>
+              <a:ext cx="0" cy="381000"/>
+            </a:xfrm>
+            <a:prstGeom prst="straightConnector1">
+              <a:avLst/>
+            </a:prstGeom>
+            <a:ln w="28575">
+              <a:solidFill>
+                <a:srgbClr val="C00000"/>
+              </a:solidFill>
+              <a:prstDash val="solid"/>
+              <a:tailEnd type="arrow"/>
+            </a:ln>
+          </p:spPr>
+          <p:style>
+            <a:lnRef idx="1">
+              <a:schemeClr val="accent1"/>
+            </a:lnRef>
+            <a:fillRef idx="0">
+              <a:schemeClr val="accent1"/>
+            </a:fillRef>
+            <a:effectRef idx="0">
+              <a:schemeClr val="accent1"/>
+            </a:effectRef>
+            <a:fontRef idx="minor">
+              <a:schemeClr val="tx1"/>
+            </a:fontRef>
+          </p:style>
+        </p:cxnSp>
+        <p:cxnSp>
+          <p:nvCxnSpPr>
+            <p:cNvPr id="39" name="Straight Arrow Connector 38"/>
+            <p:cNvCxnSpPr/>
+            <p:nvPr/>
+          </p:nvCxnSpPr>
+          <p:spPr>
+            <a:xfrm flipV="1">
+              <a:off x="1708146" y="4410960"/>
+              <a:ext cx="0" cy="301859"/>
+            </a:xfrm>
+            <a:prstGeom prst="straightConnector1">
+              <a:avLst/>
+            </a:prstGeom>
+            <a:ln w="28575">
+              <a:solidFill>
+                <a:srgbClr val="C00000"/>
+              </a:solidFill>
+              <a:prstDash val="solid"/>
+              <a:tailEnd type="arrow"/>
+            </a:ln>
+          </p:spPr>
+          <p:style>
+            <a:lnRef idx="1">
+              <a:schemeClr val="accent1"/>
+            </a:lnRef>
+            <a:fillRef idx="0">
+              <a:schemeClr val="accent1"/>
+            </a:fillRef>
+            <a:effectRef idx="0">
+              <a:schemeClr val="accent1"/>
+            </a:effectRef>
+            <a:fontRef idx="minor">
+              <a:schemeClr val="tx1"/>
+            </a:fontRef>
+          </p:style>
+        </p:cxnSp>
+      </p:grpSp>
+      <p:grpSp>
+        <p:nvGrpSpPr>
+          <p:cNvPr id="14" name="commons">
+            <a:extLst>
+              <a:ext uri="{FF2B5EF4-FFF2-40B4-BE49-F238E27FC236}">
+                <a16:creationId xmlns:a16="http://schemas.microsoft.com/office/drawing/2014/main" id="{DAB2227B-AB94-4D5F-81A0-CB2CFB3305A3}"/>
+              </a:ext>
+            </a:extLst>
+          </p:cNvPr>
+          <p:cNvGrpSpPr/>
+          <p:nvPr/>
+        </p:nvGrpSpPr>
+        <p:grpSpPr>
+          <a:xfrm>
+            <a:off x="2550898" y="4021689"/>
+            <a:ext cx="3889924" cy="1060993"/>
+            <a:chOff x="3217846" y="3515641"/>
+            <a:chExt cx="3889924" cy="1060993"/>
+          </a:xfrm>
+        </p:grpSpPr>
+        <p:sp>
+          <p:nvSpPr>
+            <p:cNvPr id="8" name="Rectangle 45"/>
+            <p:cNvSpPr/>
+            <p:nvPr/>
+          </p:nvSpPr>
+          <p:spPr>
+            <a:xfrm>
+              <a:off x="3217846" y="4131994"/>
+              <a:ext cx="2658531" cy="444640"/>
+            </a:xfrm>
+            <a:prstGeom prst="roundRect">
+              <a:avLst/>
+            </a:prstGeom>
+            <a:solidFill>
+              <a:schemeClr val="accent5">
+                <a:lumMod val="75000"/>
+              </a:schemeClr>
+            </a:solidFill>
+            <a:ln w="19050">
+              <a:solidFill>
+                <a:schemeClr val="accent5">
+                  <a:lumMod val="75000"/>
+                </a:schemeClr>
+              </a:solidFill>
+            </a:ln>
+            <a:effectLst/>
+          </p:spPr>
+          <p:style>
+            <a:lnRef idx="1">
+              <a:schemeClr val="accent5"/>
+            </a:lnRef>
+            <a:fillRef idx="2">
+              <a:schemeClr val="accent5"/>
+            </a:fillRef>
+            <a:effectRef idx="1">
+              <a:schemeClr val="accent5"/>
+            </a:effectRef>
+            <a:fontRef idx="minor">
+              <a:schemeClr val="dk1"/>
+            </a:fontRef>
+          </p:style>
+          <p:txBody>
+            <a:bodyPr rtlCol="0" anchor="ctr"/>
+            <a:lstStyle/>
+            <a:p>
+              <a:pPr algn="ctr"/>
+              <a:r>
+                <a:rPr lang="en-US" sz="1400" dirty="0">
+                  <a:solidFill>
+                    <a:schemeClr val="bg1"/>
+                  </a:solidFill>
+                </a:rPr>
+                <a:t>Commons</a:t>
+              </a:r>
+              <a:endParaRPr lang="en-SG" sz="1400" dirty="0">
+                <a:solidFill>
+                  <a:schemeClr val="bg1"/>
+                </a:solidFill>
+              </a:endParaRPr>
+            </a:p>
+          </p:txBody>
+        </p:sp>
+        <p:cxnSp>
+          <p:nvCxnSpPr>
+            <p:cNvPr id="30" name="Straight Arrow Connector 29"/>
+            <p:cNvCxnSpPr/>
+            <p:nvPr/>
+          </p:nvCxnSpPr>
+          <p:spPr>
+            <a:xfrm>
+              <a:off x="4945047" y="3750994"/>
+              <a:ext cx="0" cy="381000"/>
+            </a:xfrm>
+            <a:prstGeom prst="straightConnector1">
+              <a:avLst/>
+            </a:prstGeom>
+            <a:ln w="28575">
+              <a:solidFill>
+                <a:schemeClr val="accent5">
+                  <a:lumMod val="75000"/>
+                </a:schemeClr>
+              </a:solidFill>
+              <a:prstDash val="sysDot"/>
+              <a:tailEnd type="arrow"/>
+            </a:ln>
+          </p:spPr>
+          <p:style>
+            <a:lnRef idx="1">
+              <a:schemeClr val="accent1"/>
+            </a:lnRef>
+            <a:fillRef idx="0">
+              <a:schemeClr val="accent1"/>
+            </a:fillRef>
+            <a:effectRef idx="0">
+              <a:schemeClr val="accent1"/>
+            </a:effectRef>
+            <a:fontRef idx="minor">
+              <a:schemeClr val="tx1"/>
+            </a:fontRef>
+          </p:style>
+        </p:cxnSp>
+        <p:cxnSp>
+          <p:nvCxnSpPr>
+            <p:cNvPr id="31" name="Straight Arrow Connector 30"/>
+            <p:cNvCxnSpPr/>
+            <p:nvPr/>
+          </p:nvCxnSpPr>
+          <p:spPr>
+            <a:xfrm>
+              <a:off x="5097447" y="3761908"/>
+              <a:ext cx="0" cy="381000"/>
+            </a:xfrm>
+            <a:prstGeom prst="straightConnector1">
+              <a:avLst/>
+            </a:prstGeom>
+            <a:ln w="28575">
+              <a:solidFill>
+                <a:schemeClr val="accent5">
+                  <a:lumMod val="75000"/>
+                </a:schemeClr>
+              </a:solidFill>
+              <a:prstDash val="sysDot"/>
+              <a:tailEnd type="arrow"/>
+            </a:ln>
+          </p:spPr>
+          <p:style>
+            <a:lnRef idx="1">
+              <a:schemeClr val="accent1"/>
+            </a:lnRef>
+            <a:fillRef idx="0">
+              <a:schemeClr val="accent1"/>
+            </a:fillRef>
+            <a:effectRef idx="0">
+              <a:schemeClr val="accent1"/>
+            </a:effectRef>
+            <a:fontRef idx="minor">
+              <a:schemeClr val="tx1"/>
+            </a:fontRef>
+          </p:style>
+        </p:cxnSp>
+        <p:cxnSp>
+          <p:nvCxnSpPr>
+            <p:cNvPr id="33" name="Straight Arrow Connector 32"/>
+            <p:cNvCxnSpPr/>
+            <p:nvPr/>
+          </p:nvCxnSpPr>
+          <p:spPr>
+            <a:xfrm>
+              <a:off x="5249847" y="3750994"/>
+              <a:ext cx="0" cy="381000"/>
+            </a:xfrm>
+            <a:prstGeom prst="straightConnector1">
+              <a:avLst/>
+            </a:prstGeom>
+            <a:ln w="28575">
+              <a:solidFill>
+                <a:schemeClr val="accent5">
+                  <a:lumMod val="75000"/>
+                </a:schemeClr>
+              </a:solidFill>
+              <a:prstDash val="sysDot"/>
+              <a:tailEnd type="arrow"/>
+            </a:ln>
+          </p:spPr>
+          <p:style>
+            <a:lnRef idx="1">
+              <a:schemeClr val="accent1"/>
+            </a:lnRef>
+            <a:fillRef idx="0">
+              <a:schemeClr val="accent1"/>
+            </a:fillRef>
+            <a:effectRef idx="0">
+              <a:schemeClr val="accent1"/>
+            </a:effectRef>
+            <a:fontRef idx="minor">
+              <a:schemeClr val="tx1"/>
+            </a:fontRef>
+          </p:style>
+        </p:cxnSp>
+        <p:sp>
+          <p:nvSpPr>
+            <p:cNvPr id="26" name="Oval 25"/>
+            <p:cNvSpPr/>
+            <p:nvPr/>
+          </p:nvSpPr>
+          <p:spPr>
+            <a:xfrm>
+              <a:off x="5888569" y="3515641"/>
+              <a:ext cx="1219201" cy="533400"/>
+            </a:xfrm>
+            <a:prstGeom prst="ellipse">
+              <a:avLst/>
+            </a:prstGeom>
+            <a:solidFill>
+              <a:schemeClr val="accent5">
+                <a:lumMod val="75000"/>
+              </a:schemeClr>
+            </a:solidFill>
+            <a:ln w="19050">
+              <a:solidFill>
+                <a:schemeClr val="accent5">
+                  <a:lumMod val="75000"/>
+                </a:schemeClr>
+              </a:solidFill>
+            </a:ln>
+            <a:effectLst/>
+          </p:spPr>
+          <p:style>
+            <a:lnRef idx="1">
+              <a:schemeClr val="accent5"/>
+            </a:lnRef>
+            <a:fillRef idx="2">
+              <a:schemeClr val="accent5"/>
+            </a:fillRef>
+            <a:effectRef idx="1">
+              <a:schemeClr val="accent5"/>
+            </a:effectRef>
+            <a:fontRef idx="minor">
+              <a:schemeClr val="dk1"/>
+            </a:fontRef>
+          </p:style>
+          <p:txBody>
+            <a:bodyPr rtlCol="0" anchor="ctr"/>
+            <a:lstStyle/>
+            <a:p>
+              <a:pPr algn="ctr"/>
+              <a:r>
+                <a:rPr lang="en-US" sz="1600" dirty="0">
+                  <a:solidFill>
+                    <a:schemeClr val="bg1"/>
+                  </a:solidFill>
+                </a:rPr>
+                <a:t>Logs</a:t>
+              </a:r>
+              <a:br>
+                <a:rPr lang="en-US" sz="1600" dirty="0">
+                  <a:solidFill>
+                    <a:schemeClr val="bg1"/>
+                  </a:solidFill>
+                </a:rPr>
+              </a:br>
+              <a:r>
+                <a:rPr lang="en-US" sz="1600" dirty="0">
+                  <a:solidFill>
+                    <a:schemeClr val="bg1"/>
+                  </a:solidFill>
+                </a:rPr>
+                <a:t>Center</a:t>
+              </a:r>
+            </a:p>
+          </p:txBody>
+        </p:sp>
+        <p:cxnSp>
+          <p:nvCxnSpPr>
+            <p:cNvPr id="40" name="Elbow Connector 39"/>
+            <p:cNvCxnSpPr>
+              <a:stCxn id="26" idx="4"/>
+              <a:endCxn id="8" idx="3"/>
+            </p:cNvCxnSpPr>
+            <p:nvPr/>
+          </p:nvCxnSpPr>
+          <p:spPr>
+            <a:xfrm rot="5400000">
+              <a:off x="6034638" y="3890781"/>
+              <a:ext cx="305273" cy="621793"/>
+            </a:xfrm>
+            <a:prstGeom prst="bentConnector2">
+              <a:avLst/>
+            </a:prstGeom>
+            <a:ln w="28575">
+              <a:solidFill>
+                <a:schemeClr val="accent5">
+                  <a:lumMod val="75000"/>
+                </a:schemeClr>
+              </a:solidFill>
+            </a:ln>
+          </p:spPr>
+          <p:style>
+            <a:lnRef idx="1">
+              <a:schemeClr val="accent1"/>
+            </a:lnRef>
+            <a:fillRef idx="0">
+              <a:schemeClr val="accent1"/>
+            </a:fillRef>
+            <a:effectRef idx="0">
+              <a:schemeClr val="accent1"/>
+            </a:effectRef>
+            <a:fontRef idx="minor">
+              <a:schemeClr val="tx1"/>
+            </a:fontRef>
+          </p:style>
+        </p:cxnSp>
+      </p:grpSp>
+      <p:sp>
+        <p:nvSpPr>
+          <p:cNvPr id="41" name="Rectangle 45">
+            <a:extLst>
+              <a:ext uri="{FF2B5EF4-FFF2-40B4-BE49-F238E27FC236}">
+                <a16:creationId xmlns:a16="http://schemas.microsoft.com/office/drawing/2014/main" id="{6AE08482-8246-4E5D-A96E-F872ABE9F8E1}"/>
+              </a:ext>
+            </a:extLst>
+          </p:cNvPr>
           <p:cNvSpPr/>
           <p:nvPr/>
         </p:nvSpPr>
         <p:spPr>
-          <a:xfrm flipH="1">
-            <a:off x="1964269" y="3959459"/>
-            <a:ext cx="778931" cy="570908"/>
+          <a:xfrm>
+            <a:off x="2766481" y="1970071"/>
+            <a:ext cx="1295400" cy="550800"/>
           </a:xfrm>
           <a:prstGeom prst="roundRect">
             <a:avLst/>
           </a:prstGeom>
           <a:solidFill>
-            <a:srgbClr val="C00000"/>
+            <a:srgbClr val="597B78"/>
           </a:solidFill>
           <a:ln w="19050">
             <a:solidFill>
-              <a:srgbClr val="C00000"/>
+              <a:srgbClr val="597B78"/>
             </a:solidFill>
           </a:ln>
           <a:effectLst/>
         </p:spPr>
         <p:style>
           <a:lnRef idx="1">
-            <a:schemeClr val="accent2"/>
+            <a:schemeClr val="accent5"/>
           </a:lnRef>
           <a:fillRef idx="2">
-            <a:schemeClr val="accent2"/>
+            <a:schemeClr val="accent5"/>
           </a:fillRef>
           <a:effectRef idx="1">
-            <a:schemeClr val="accent2"/>
+            <a:schemeClr val="accent5"/>
           </a:effectRef>
           <a:fontRef idx="minor">
             <a:schemeClr val="dk1"/>
@@ -4307,14 +4808,14 @@
           <a:p>
             <a:pPr algn="ctr"/>
             <a:r>
-              <a:rPr lang="en-US" sz="1600" dirty="0">
+              <a:rPr lang="en-US" sz="1600" dirty="0" err="1">
                 <a:solidFill>
                   <a:schemeClr val="bg1"/>
                 </a:solidFill>
               </a:rPr>
-              <a:t>Main</a:t>
-            </a:r>
-            <a:endParaRPr lang="en-SG" sz="1600" dirty="0">
+              <a:t>QuizModel</a:t>
+            </a:r>
+            <a:endParaRPr lang="en-US" sz="1600" dirty="0">
               <a:solidFill>
                 <a:schemeClr val="bg1"/>
               </a:solidFill>
@@ -4324,25 +4825,32 @@
       </p:sp>
       <p:cxnSp>
         <p:nvCxnSpPr>
-          <p:cNvPr id="30" name="Straight Arrow Connector 29"/>
-          <p:cNvCxnSpPr/>
+          <p:cNvPr id="42" name="Straight Arrow Connector 41">
+            <a:extLst>
+              <a:ext uri="{FF2B5EF4-FFF2-40B4-BE49-F238E27FC236}">
+                <a16:creationId xmlns:a16="http://schemas.microsoft.com/office/drawing/2014/main" id="{03576ACC-D8D8-494C-938E-D3E724FB0BE4}"/>
+              </a:ext>
+            </a:extLst>
+          </p:cNvPr>
+          <p:cNvCxnSpPr>
+            <a:cxnSpLocks/>
+            <a:stCxn id="3" idx="0"/>
+            <a:endCxn id="41" idx="2"/>
+          </p:cNvCxnSpPr>
           <p:nvPr/>
         </p:nvCxnSpPr>
         <p:spPr>
-          <a:xfrm>
-            <a:off x="4945047" y="3750994"/>
-            <a:ext cx="0" cy="381000"/>
+          <a:xfrm flipV="1">
+            <a:off x="3414181" y="2520871"/>
+            <a:ext cx="0" cy="308005"/>
           </a:xfrm>
           <a:prstGeom prst="straightConnector1">
             <a:avLst/>
           </a:prstGeom>
           <a:ln w="28575">
             <a:solidFill>
-              <a:schemeClr val="accent5">
-                <a:lumMod val="75000"/>
-              </a:schemeClr>
+              <a:srgbClr val="0070C0"/>
             </a:solidFill>
-            <a:prstDash val="sysDot"/>
             <a:tailEnd type="arrow"/>
           </a:ln>
         </p:spPr>
@@ -4363,291 +4871,31 @@
       </p:cxnSp>
       <p:cxnSp>
         <p:nvCxnSpPr>
-          <p:cNvPr id="31" name="Straight Arrow Connector 30"/>
-          <p:cNvCxnSpPr/>
+          <p:cNvPr id="43" name="Straight Arrow Connector 42">
+            <a:extLst>
+              <a:ext uri="{FF2B5EF4-FFF2-40B4-BE49-F238E27FC236}">
+                <a16:creationId xmlns:a16="http://schemas.microsoft.com/office/drawing/2014/main" id="{80FC23EF-DA07-4666-9A56-49DACFA7FFFA}"/>
+              </a:ext>
+            </a:extLst>
+          </p:cNvPr>
+          <p:cNvCxnSpPr>
+            <a:cxnSpLocks/>
+          </p:cNvCxnSpPr>
           <p:nvPr/>
         </p:nvCxnSpPr>
         <p:spPr>
           <a:xfrm>
-            <a:off x="5097447" y="3761908"/>
-            <a:ext cx="0" cy="381000"/>
+            <a:off x="1924051" y="2362200"/>
+            <a:ext cx="842430" cy="0"/>
           </a:xfrm>
           <a:prstGeom prst="straightConnector1">
             <a:avLst/>
           </a:prstGeom>
           <a:ln w="28575">
             <a:solidFill>
-              <a:schemeClr val="accent5">
-                <a:lumMod val="75000"/>
-              </a:schemeClr>
+              <a:srgbClr val="00B050"/>
             </a:solidFill>
-            <a:prstDash val="sysDot"/>
             <a:tailEnd type="arrow"/>
-          </a:ln>
-        </p:spPr>
-        <p:style>
-          <a:lnRef idx="1">
-            <a:schemeClr val="accent1"/>
-          </a:lnRef>
-          <a:fillRef idx="0">
-            <a:schemeClr val="accent1"/>
-          </a:fillRef>
-          <a:effectRef idx="0">
-            <a:schemeClr val="accent1"/>
-          </a:effectRef>
-          <a:fontRef idx="minor">
-            <a:schemeClr val="tx1"/>
-          </a:fontRef>
-        </p:style>
-      </p:cxnSp>
-      <p:cxnSp>
-        <p:nvCxnSpPr>
-          <p:cNvPr id="33" name="Straight Arrow Connector 32"/>
-          <p:cNvCxnSpPr/>
-          <p:nvPr/>
-        </p:nvCxnSpPr>
-        <p:spPr>
-          <a:xfrm>
-            <a:off x="5249847" y="3750994"/>
-            <a:ext cx="0" cy="381000"/>
-          </a:xfrm>
-          <a:prstGeom prst="straightConnector1">
-            <a:avLst/>
-          </a:prstGeom>
-          <a:ln w="28575">
-            <a:solidFill>
-              <a:schemeClr val="accent5">
-                <a:lumMod val="75000"/>
-              </a:schemeClr>
-            </a:solidFill>
-            <a:prstDash val="sysDot"/>
-            <a:tailEnd type="arrow"/>
-          </a:ln>
-        </p:spPr>
-        <p:style>
-          <a:lnRef idx="1">
-            <a:schemeClr val="accent1"/>
-          </a:lnRef>
-          <a:fillRef idx="0">
-            <a:schemeClr val="accent1"/>
-          </a:fillRef>
-          <a:effectRef idx="0">
-            <a:schemeClr val="accent1"/>
-          </a:effectRef>
-          <a:fontRef idx="minor">
-            <a:schemeClr val="tx1"/>
-          </a:fontRef>
-        </p:style>
-      </p:cxnSp>
-      <p:cxnSp>
-        <p:nvCxnSpPr>
-          <p:cNvPr id="37" name="Straight Arrow Connector 36"/>
-          <p:cNvCxnSpPr>
-            <a:stCxn id="23" idx="1"/>
-          </p:cNvCxnSpPr>
-          <p:nvPr/>
-        </p:nvCxnSpPr>
-        <p:spPr>
-          <a:xfrm>
-            <a:off x="2743200" y="4244913"/>
-            <a:ext cx="249770" cy="0"/>
-          </a:xfrm>
-          <a:prstGeom prst="straightConnector1">
-            <a:avLst/>
-          </a:prstGeom>
-          <a:ln w="28575">
-            <a:solidFill>
-              <a:srgbClr val="C00000"/>
-            </a:solidFill>
-            <a:prstDash val="solid"/>
-            <a:tailEnd type="arrow"/>
-          </a:ln>
-        </p:spPr>
-        <p:style>
-          <a:lnRef idx="1">
-            <a:schemeClr val="accent1"/>
-          </a:lnRef>
-          <a:fillRef idx="0">
-            <a:schemeClr val="accent1"/>
-          </a:fillRef>
-          <a:effectRef idx="0">
-            <a:schemeClr val="accent1"/>
-          </a:effectRef>
-          <a:fontRef idx="minor">
-            <a:schemeClr val="tx1"/>
-          </a:fontRef>
-        </p:style>
-      </p:cxnSp>
-      <p:cxnSp>
-        <p:nvCxnSpPr>
-          <p:cNvPr id="38" name="Straight Arrow Connector 37"/>
-          <p:cNvCxnSpPr/>
-          <p:nvPr/>
-        </p:nvCxnSpPr>
-        <p:spPr>
-          <a:xfrm rot="13867188">
-            <a:off x="2743200" y="3755022"/>
-            <a:ext cx="0" cy="381000"/>
-          </a:xfrm>
-          <a:prstGeom prst="straightConnector1">
-            <a:avLst/>
-          </a:prstGeom>
-          <a:ln w="28575">
-            <a:solidFill>
-              <a:srgbClr val="C00000"/>
-            </a:solidFill>
-            <a:prstDash val="solid"/>
-            <a:tailEnd type="arrow"/>
-          </a:ln>
-        </p:spPr>
-        <p:style>
-          <a:lnRef idx="1">
-            <a:schemeClr val="accent1"/>
-          </a:lnRef>
-          <a:fillRef idx="0">
-            <a:schemeClr val="accent1"/>
-          </a:fillRef>
-          <a:effectRef idx="0">
-            <a:schemeClr val="accent1"/>
-          </a:effectRef>
-          <a:fontRef idx="minor">
-            <a:schemeClr val="tx1"/>
-          </a:fontRef>
-        </p:style>
-      </p:cxnSp>
-      <p:cxnSp>
-        <p:nvCxnSpPr>
-          <p:cNvPr id="39" name="Straight Arrow Connector 38"/>
-          <p:cNvCxnSpPr/>
-          <p:nvPr/>
-        </p:nvCxnSpPr>
-        <p:spPr>
-          <a:xfrm flipV="1">
-            <a:off x="2353734" y="3697061"/>
-            <a:ext cx="0" cy="301859"/>
-          </a:xfrm>
-          <a:prstGeom prst="straightConnector1">
-            <a:avLst/>
-          </a:prstGeom>
-          <a:ln w="28575">
-            <a:solidFill>
-              <a:srgbClr val="C00000"/>
-            </a:solidFill>
-            <a:prstDash val="solid"/>
-            <a:tailEnd type="arrow"/>
-          </a:ln>
-        </p:spPr>
-        <p:style>
-          <a:lnRef idx="1">
-            <a:schemeClr val="accent1"/>
-          </a:lnRef>
-          <a:fillRef idx="0">
-            <a:schemeClr val="accent1"/>
-          </a:fillRef>
-          <a:effectRef idx="0">
-            <a:schemeClr val="accent1"/>
-          </a:effectRef>
-          <a:fontRef idx="minor">
-            <a:schemeClr val="tx1"/>
-          </a:fontRef>
-        </p:style>
-      </p:cxnSp>
-      <p:sp>
-        <p:nvSpPr>
-          <p:cNvPr id="26" name="Oval 25"/>
-          <p:cNvSpPr/>
-          <p:nvPr/>
-        </p:nvSpPr>
-        <p:spPr>
-          <a:xfrm>
-            <a:off x="5888569" y="3515641"/>
-            <a:ext cx="1219201" cy="533400"/>
-          </a:xfrm>
-          <a:prstGeom prst="ellipse">
-            <a:avLst/>
-          </a:prstGeom>
-          <a:solidFill>
-            <a:schemeClr val="accent5">
-              <a:lumMod val="75000"/>
-            </a:schemeClr>
-          </a:solidFill>
-          <a:ln w="19050">
-            <a:solidFill>
-              <a:schemeClr val="accent5">
-                <a:lumMod val="75000"/>
-              </a:schemeClr>
-            </a:solidFill>
-          </a:ln>
-          <a:effectLst/>
-        </p:spPr>
-        <p:style>
-          <a:lnRef idx="1">
-            <a:schemeClr val="accent5"/>
-          </a:lnRef>
-          <a:fillRef idx="2">
-            <a:schemeClr val="accent5"/>
-          </a:fillRef>
-          <a:effectRef idx="1">
-            <a:schemeClr val="accent5"/>
-          </a:effectRef>
-          <a:fontRef idx="minor">
-            <a:schemeClr val="dk1"/>
-          </a:fontRef>
-        </p:style>
-        <p:txBody>
-          <a:bodyPr rtlCol="0" anchor="ctr"/>
-          <a:lstStyle/>
-          <a:p>
-            <a:pPr algn="ctr"/>
-            <a:r>
-              <a:rPr lang="en-US" sz="1600" dirty="0">
-                <a:solidFill>
-                  <a:schemeClr val="bg1"/>
-                </a:solidFill>
-              </a:rPr>
-              <a:t>Logs</a:t>
-            </a:r>
-            <a:br>
-              <a:rPr lang="en-US" sz="1600" dirty="0">
-                <a:solidFill>
-                  <a:schemeClr val="bg1"/>
-                </a:solidFill>
-              </a:rPr>
-            </a:br>
-            <a:r>
-              <a:rPr lang="en-US" sz="1600" dirty="0">
-                <a:solidFill>
-                  <a:schemeClr val="bg1"/>
-                </a:solidFill>
-              </a:rPr>
-              <a:t>Center</a:t>
-            </a:r>
-          </a:p>
-        </p:txBody>
-      </p:sp>
-      <p:cxnSp>
-        <p:nvCxnSpPr>
-          <p:cNvPr id="40" name="Elbow Connector 39"/>
-          <p:cNvCxnSpPr>
-            <a:stCxn id="26" idx="4"/>
-            <a:endCxn id="8" idx="3"/>
-          </p:cNvCxnSpPr>
-          <p:nvPr/>
-        </p:nvCxnSpPr>
-        <p:spPr>
-          <a:xfrm rot="5400000">
-            <a:off x="6034638" y="3890781"/>
-            <a:ext cx="305273" cy="621793"/>
-          </a:xfrm>
-          <a:prstGeom prst="bentConnector2">
-            <a:avLst/>
-          </a:prstGeom>
-          <a:ln w="28575">
-            <a:solidFill>
-              <a:schemeClr val="accent5">
-                <a:lumMod val="75000"/>
-              </a:schemeClr>
-            </a:solidFill>
           </a:ln>
         </p:spPr>
         <p:style>

</xml_diff>

<commit_message>
Updated UGDG, updated some diagrams, updated PPP Fixed some errors in courses.json changed some files, refactored some codes
</commit_message>
<xml_diff>
--- a/docs/diagrams/ArchitectureDiagram.pptx
+++ b/docs/diagrams/ArchitectureDiagram.pptx
@@ -208,7 +208,7 @@
           <a:p>
             <a:fld id="{F5CC4B3F-88C1-4FFA-B1B6-F41C21DC6924}" type="datetimeFigureOut">
               <a:rPr lang="en-US" smtClean="0"/>
-              <a:t>12/15/2018</a:t>
+              <a:t>4/2/2019</a:t>
             </a:fld>
             <a:endParaRPr lang="en-US"/>
           </a:p>
@@ -654,7 +654,7 @@
           <a:p>
             <a:fld id="{78C97017-6FC3-485B-9764-EAC9E56C1D49}" type="datetimeFigureOut">
               <a:rPr lang="en-US" smtClean="0"/>
-              <a:t>12/15/2018</a:t>
+              <a:t>4/2/2019</a:t>
             </a:fld>
             <a:endParaRPr lang="en-US"/>
           </a:p>
@@ -822,7 +822,7 @@
           <a:p>
             <a:fld id="{78C97017-6FC3-485B-9764-EAC9E56C1D49}" type="datetimeFigureOut">
               <a:rPr lang="en-US" smtClean="0"/>
-              <a:t>12/15/2018</a:t>
+              <a:t>4/2/2019</a:t>
             </a:fld>
             <a:endParaRPr lang="en-US"/>
           </a:p>
@@ -1000,7 +1000,7 @@
           <a:p>
             <a:fld id="{78C97017-6FC3-485B-9764-EAC9E56C1D49}" type="datetimeFigureOut">
               <a:rPr lang="en-US" smtClean="0"/>
-              <a:t>12/15/2018</a:t>
+              <a:t>4/2/2019</a:t>
             </a:fld>
             <a:endParaRPr lang="en-US"/>
           </a:p>
@@ -1168,7 +1168,7 @@
           <a:p>
             <a:fld id="{78C97017-6FC3-485B-9764-EAC9E56C1D49}" type="datetimeFigureOut">
               <a:rPr lang="en-US" smtClean="0"/>
-              <a:t>12/15/2018</a:t>
+              <a:t>4/2/2019</a:t>
             </a:fld>
             <a:endParaRPr lang="en-US"/>
           </a:p>
@@ -1413,7 +1413,7 @@
           <a:p>
             <a:fld id="{78C97017-6FC3-485B-9764-EAC9E56C1D49}" type="datetimeFigureOut">
               <a:rPr lang="en-US" smtClean="0"/>
-              <a:t>12/15/2018</a:t>
+              <a:t>4/2/2019</a:t>
             </a:fld>
             <a:endParaRPr lang="en-US"/>
           </a:p>
@@ -1698,7 +1698,7 @@
           <a:p>
             <a:fld id="{78C97017-6FC3-485B-9764-EAC9E56C1D49}" type="datetimeFigureOut">
               <a:rPr lang="en-US" smtClean="0"/>
-              <a:t>12/15/2018</a:t>
+              <a:t>4/2/2019</a:t>
             </a:fld>
             <a:endParaRPr lang="en-US"/>
           </a:p>
@@ -2117,7 +2117,7 @@
           <a:p>
             <a:fld id="{78C97017-6FC3-485B-9764-EAC9E56C1D49}" type="datetimeFigureOut">
               <a:rPr lang="en-US" smtClean="0"/>
-              <a:t>12/15/2018</a:t>
+              <a:t>4/2/2019</a:t>
             </a:fld>
             <a:endParaRPr lang="en-US"/>
           </a:p>
@@ -2234,7 +2234,7 @@
           <a:p>
             <a:fld id="{78C97017-6FC3-485B-9764-EAC9E56C1D49}" type="datetimeFigureOut">
               <a:rPr lang="en-US" smtClean="0"/>
-              <a:t>12/15/2018</a:t>
+              <a:t>4/2/2019</a:t>
             </a:fld>
             <a:endParaRPr lang="en-US"/>
           </a:p>
@@ -2329,7 +2329,7 @@
           <a:p>
             <a:fld id="{78C97017-6FC3-485B-9764-EAC9E56C1D49}" type="datetimeFigureOut">
               <a:rPr lang="en-US" smtClean="0"/>
-              <a:t>12/15/2018</a:t>
+              <a:t>4/2/2019</a:t>
             </a:fld>
             <a:endParaRPr lang="en-US"/>
           </a:p>
@@ -2604,7 +2604,7 @@
           <a:p>
             <a:fld id="{78C97017-6FC3-485B-9764-EAC9E56C1D49}" type="datetimeFigureOut">
               <a:rPr lang="en-US" smtClean="0"/>
-              <a:t>12/15/2018</a:t>
+              <a:t>4/2/2019</a:t>
             </a:fld>
             <a:endParaRPr lang="en-US"/>
           </a:p>
@@ -2856,7 +2856,7 @@
           <a:p>
             <a:fld id="{78C97017-6FC3-485B-9764-EAC9E56C1D49}" type="datetimeFigureOut">
               <a:rPr lang="en-US" smtClean="0"/>
-              <a:t>12/15/2018</a:t>
+              <a:t>4/2/2019</a:t>
             </a:fld>
             <a:endParaRPr lang="en-US"/>
           </a:p>
@@ -3067,7 +3067,7 @@
           <a:p>
             <a:fld id="{78C97017-6FC3-485B-9764-EAC9E56C1D49}" type="datetimeFigureOut">
               <a:rPr lang="en-US" smtClean="0"/>
-              <a:t>12/15/2018</a:t>
+              <a:t>4/2/2019</a:t>
             </a:fld>
             <a:endParaRPr lang="en-US"/>
           </a:p>
@@ -3662,12 +3662,12 @@
           <a:p>
             <a:pPr algn="ctr"/>
             <a:r>
-              <a:rPr lang="en-US" sz="1600" dirty="0">
+              <a:rPr lang="en-US" sz="1600" dirty="0" err="1">
                 <a:solidFill>
                   <a:schemeClr val="bg1"/>
                 </a:solidFill>
               </a:rPr>
-              <a:t>Storage</a:t>
+              <a:t>GradTrak</a:t>
             </a:r>
             <a:endParaRPr lang="en-SG" sz="1600" dirty="0">
               <a:solidFill>
@@ -3956,7 +3956,7 @@
         </p:nvSpPr>
         <p:spPr>
           <a:xfrm>
-            <a:off x="1202269" y="2743200"/>
+            <a:off x="1006508" y="2743200"/>
             <a:ext cx="381000" cy="381000"/>
           </a:xfrm>
           <a:prstGeom prst="smileyFace">
@@ -3999,13 +3999,15 @@
       <p:cxnSp>
         <p:nvCxnSpPr>
           <p:cNvPr id="32" name="Straight Arrow Connector 31"/>
-          <p:cNvCxnSpPr/>
+          <p:cNvCxnSpPr>
+            <a:cxnSpLocks/>
+          </p:cNvCxnSpPr>
           <p:nvPr/>
         </p:nvCxnSpPr>
         <p:spPr>
-          <a:xfrm flipV="1">
-            <a:off x="1636188" y="2939996"/>
-            <a:ext cx="273050" cy="1"/>
+          <a:xfrm>
+            <a:off x="1468998" y="2951937"/>
+            <a:ext cx="440240" cy="1"/>
           </a:xfrm>
           <a:prstGeom prst="straightConnector1">
             <a:avLst/>
@@ -4164,105 +4166,10 @@
           <a:lstStyle/>
           <a:p>
             <a:pPr algn="ctr"/>
-            <a:endParaRPr lang="en-US"/>
-          </a:p>
-        </p:txBody>
-      </p:sp>
-      <p:sp>
-        <p:nvSpPr>
-          <p:cNvPr id="51" name="Cloud 50"/>
-          <p:cNvSpPr/>
-          <p:nvPr/>
-        </p:nvSpPr>
-        <p:spPr>
-          <a:xfrm>
-            <a:off x="2650069" y="1447800"/>
-            <a:ext cx="914400" cy="533400"/>
-          </a:xfrm>
-          <a:prstGeom prst="cloud">
-            <a:avLst/>
-          </a:prstGeom>
-          <a:solidFill>
-            <a:schemeClr val="bg1"/>
-          </a:solidFill>
-          <a:ln>
-            <a:solidFill>
-              <a:schemeClr val="tx1"/>
-            </a:solidFill>
-          </a:ln>
-        </p:spPr>
-        <p:style>
-          <a:lnRef idx="2">
-            <a:schemeClr val="accent1">
-              <a:shade val="50000"/>
-            </a:schemeClr>
-          </a:lnRef>
-          <a:fillRef idx="1">
-            <a:schemeClr val="accent1"/>
-          </a:fillRef>
-          <a:effectRef idx="0">
-            <a:schemeClr val="accent1"/>
-          </a:effectRef>
-          <a:fontRef idx="minor">
-            <a:schemeClr val="lt1"/>
-          </a:fontRef>
-        </p:style>
-        <p:txBody>
-          <a:bodyPr rtlCol="0" anchor="ctr"/>
-          <a:lstStyle/>
-          <a:p>
-            <a:pPr algn="ctr"/>
-            <a:r>
-              <a:rPr lang="en-US" sz="1400" dirty="0">
-                <a:solidFill>
-                  <a:schemeClr val="tx1"/>
-                </a:solidFill>
-              </a:rPr>
-              <a:t>Web</a:t>
-            </a:r>
-          </a:p>
-        </p:txBody>
-      </p:sp>
-      <p:cxnSp>
-        <p:nvCxnSpPr>
-          <p:cNvPr id="52" name="Elbow Connector 51"/>
-          <p:cNvCxnSpPr>
-            <a:stCxn id="2" idx="0"/>
-            <a:endCxn id="51" idx="2"/>
-          </p:cNvCxnSpPr>
-          <p:nvPr/>
-        </p:nvCxnSpPr>
-        <p:spPr>
-          <a:xfrm rot="5400000" flipH="1" flipV="1">
-            <a:off x="2222648" y="1760922"/>
-            <a:ext cx="476678" cy="383835"/>
-          </a:xfrm>
-          <a:prstGeom prst="bentConnector2">
-            <a:avLst/>
-          </a:prstGeom>
-          <a:ln w="28575">
-            <a:solidFill>
-              <a:srgbClr val="00B050"/>
-            </a:solidFill>
-            <a:prstDash val="sysDot"/>
-            <a:tailEnd type="arrow"/>
-          </a:ln>
-        </p:spPr>
-        <p:style>
-          <a:lnRef idx="1">
-            <a:schemeClr val="accent1"/>
-          </a:lnRef>
-          <a:fillRef idx="0">
-            <a:schemeClr val="accent1"/>
-          </a:fillRef>
-          <a:effectRef idx="0">
-            <a:schemeClr val="accent1"/>
-          </a:effectRef>
-          <a:fontRef idx="minor">
-            <a:schemeClr val="tx1"/>
-          </a:fontRef>
-        </p:style>
-      </p:cxnSp>
+            <a:endParaRPr lang="en-US" dirty="0"/>
+          </a:p>
+        </p:txBody>
+      </p:sp>
       <p:sp>
         <p:nvSpPr>
           <p:cNvPr id="23" name="Rectangle 62"/>
@@ -4665,6 +4572,87 @@
           </a:fontRef>
         </p:style>
       </p:cxnSp>
+      <p:sp>
+        <p:nvSpPr>
+          <p:cNvPr id="6" name="TextBox 5">
+            <a:extLst>
+              <a:ext uri="{FF2B5EF4-FFF2-40B4-BE49-F238E27FC236}">
+                <a16:creationId xmlns:a16="http://schemas.microsoft.com/office/drawing/2014/main" id="{0C0972AA-0274-4D06-BE1B-91A27AA25F64}"/>
+              </a:ext>
+            </a:extLst>
+          </p:cNvPr>
+          <p:cNvSpPr txBox="1"/>
+          <p:nvPr/>
+        </p:nvSpPr>
+        <p:spPr>
+          <a:xfrm>
+            <a:off x="609600" y="3115577"/>
+            <a:ext cx="1147238" cy="646331"/>
+          </a:xfrm>
+          <a:prstGeom prst="rect">
+            <a:avLst/>
+          </a:prstGeom>
+          <a:noFill/>
+        </p:spPr>
+        <p:txBody>
+          <a:bodyPr wrap="square" rtlCol="0">
+            <a:spAutoFit/>
+          </a:bodyPr>
+          <a:lstStyle/>
+          <a:p>
+            <a:pPr algn="ctr"/>
+            <a:r>
+              <a:rPr lang="en-US" dirty="0"/>
+              <a:t>User </a:t>
+            </a:r>
+          </a:p>
+          <a:p>
+            <a:pPr algn="ctr"/>
+            <a:r>
+              <a:rPr lang="en-US" dirty="0"/>
+              <a:t>(You!)</a:t>
+            </a:r>
+            <a:endParaRPr lang="en-SG" dirty="0"/>
+          </a:p>
+        </p:txBody>
+      </p:sp>
+      <p:sp>
+        <p:nvSpPr>
+          <p:cNvPr id="42" name="TextBox 41">
+            <a:extLst>
+              <a:ext uri="{FF2B5EF4-FFF2-40B4-BE49-F238E27FC236}">
+                <a16:creationId xmlns:a16="http://schemas.microsoft.com/office/drawing/2014/main" id="{B5B78D01-C55F-4D6E-A1FC-770ED95E6AE3}"/>
+              </a:ext>
+            </a:extLst>
+          </p:cNvPr>
+          <p:cNvSpPr txBox="1"/>
+          <p:nvPr/>
+        </p:nvSpPr>
+        <p:spPr>
+          <a:xfrm>
+            <a:off x="7391400" y="2782669"/>
+            <a:ext cx="1147238" cy="646331"/>
+          </a:xfrm>
+          <a:prstGeom prst="rect">
+            <a:avLst/>
+          </a:prstGeom>
+          <a:noFill/>
+        </p:spPr>
+        <p:txBody>
+          <a:bodyPr wrap="square" rtlCol="0">
+            <a:spAutoFit/>
+          </a:bodyPr>
+          <a:lstStyle/>
+          <a:p>
+            <a:pPr algn="ctr"/>
+            <a:r>
+              <a:rPr lang="en-US" dirty="0"/>
+              <a:t>Storage Files</a:t>
+            </a:r>
+            <a:endParaRPr lang="en-SG" dirty="0"/>
+          </a:p>
+        </p:txBody>
+      </p:sp>
     </p:spTree>
     <p:extLst>
       <p:ext uri="{BB962C8B-B14F-4D97-AF65-F5344CB8AC3E}">

</xml_diff>

<commit_message>
Updated user guide and readme
</commit_message>
<xml_diff>
--- a/docs/diagrams/ArchitectureDiagram.pptx
+++ b/docs/diagrams/ArchitectureDiagram.pptx
@@ -208,7 +208,7 @@
           <a:p>
             <a:fld id="{F5CC4B3F-88C1-4FFA-B1B6-F41C21DC6924}" type="datetimeFigureOut">
               <a:rPr lang="en-US" smtClean="0"/>
-              <a:t>12/15/2018</a:t>
+              <a:t>4/3/19</a:t>
             </a:fld>
             <a:endParaRPr lang="en-US"/>
           </a:p>
@@ -654,7 +654,7 @@
           <a:p>
             <a:fld id="{78C97017-6FC3-485B-9764-EAC9E56C1D49}" type="datetimeFigureOut">
               <a:rPr lang="en-US" smtClean="0"/>
-              <a:t>12/15/2018</a:t>
+              <a:t>4/3/19</a:t>
             </a:fld>
             <a:endParaRPr lang="en-US"/>
           </a:p>
@@ -822,7 +822,7 @@
           <a:p>
             <a:fld id="{78C97017-6FC3-485B-9764-EAC9E56C1D49}" type="datetimeFigureOut">
               <a:rPr lang="en-US" smtClean="0"/>
-              <a:t>12/15/2018</a:t>
+              <a:t>4/3/19</a:t>
             </a:fld>
             <a:endParaRPr lang="en-US"/>
           </a:p>
@@ -1000,7 +1000,7 @@
           <a:p>
             <a:fld id="{78C97017-6FC3-485B-9764-EAC9E56C1D49}" type="datetimeFigureOut">
               <a:rPr lang="en-US" smtClean="0"/>
-              <a:t>12/15/2018</a:t>
+              <a:t>4/3/19</a:t>
             </a:fld>
             <a:endParaRPr lang="en-US"/>
           </a:p>
@@ -1168,7 +1168,7 @@
           <a:p>
             <a:fld id="{78C97017-6FC3-485B-9764-EAC9E56C1D49}" type="datetimeFigureOut">
               <a:rPr lang="en-US" smtClean="0"/>
-              <a:t>12/15/2018</a:t>
+              <a:t>4/3/19</a:t>
             </a:fld>
             <a:endParaRPr lang="en-US"/>
           </a:p>
@@ -1413,7 +1413,7 @@
           <a:p>
             <a:fld id="{78C97017-6FC3-485B-9764-EAC9E56C1D49}" type="datetimeFigureOut">
               <a:rPr lang="en-US" smtClean="0"/>
-              <a:t>12/15/2018</a:t>
+              <a:t>4/3/19</a:t>
             </a:fld>
             <a:endParaRPr lang="en-US"/>
           </a:p>
@@ -1698,7 +1698,7 @@
           <a:p>
             <a:fld id="{78C97017-6FC3-485B-9764-EAC9E56C1D49}" type="datetimeFigureOut">
               <a:rPr lang="en-US" smtClean="0"/>
-              <a:t>12/15/2018</a:t>
+              <a:t>4/3/19</a:t>
             </a:fld>
             <a:endParaRPr lang="en-US"/>
           </a:p>
@@ -2117,7 +2117,7 @@
           <a:p>
             <a:fld id="{78C97017-6FC3-485B-9764-EAC9E56C1D49}" type="datetimeFigureOut">
               <a:rPr lang="en-US" smtClean="0"/>
-              <a:t>12/15/2018</a:t>
+              <a:t>4/3/19</a:t>
             </a:fld>
             <a:endParaRPr lang="en-US"/>
           </a:p>
@@ -2234,7 +2234,7 @@
           <a:p>
             <a:fld id="{78C97017-6FC3-485B-9764-EAC9E56C1D49}" type="datetimeFigureOut">
               <a:rPr lang="en-US" smtClean="0"/>
-              <a:t>12/15/2018</a:t>
+              <a:t>4/3/19</a:t>
             </a:fld>
             <a:endParaRPr lang="en-US"/>
           </a:p>
@@ -2329,7 +2329,7 @@
           <a:p>
             <a:fld id="{78C97017-6FC3-485B-9764-EAC9E56C1D49}" type="datetimeFigureOut">
               <a:rPr lang="en-US" smtClean="0"/>
-              <a:t>12/15/2018</a:t>
+              <a:t>4/3/19</a:t>
             </a:fld>
             <a:endParaRPr lang="en-US"/>
           </a:p>
@@ -2604,7 +2604,7 @@
           <a:p>
             <a:fld id="{78C97017-6FC3-485B-9764-EAC9E56C1D49}" type="datetimeFigureOut">
               <a:rPr lang="en-US" smtClean="0"/>
-              <a:t>12/15/2018</a:t>
+              <a:t>4/3/19</a:t>
             </a:fld>
             <a:endParaRPr lang="en-US"/>
           </a:p>
@@ -2856,7 +2856,7 @@
           <a:p>
             <a:fld id="{78C97017-6FC3-485B-9764-EAC9E56C1D49}" type="datetimeFigureOut">
               <a:rPr lang="en-US" smtClean="0"/>
-              <a:t>12/15/2018</a:t>
+              <a:t>4/3/19</a:t>
             </a:fld>
             <a:endParaRPr lang="en-US"/>
           </a:p>
@@ -3067,7 +3067,7 @@
           <a:p>
             <a:fld id="{78C97017-6FC3-485B-9764-EAC9E56C1D49}" type="datetimeFigureOut">
               <a:rPr lang="en-US" smtClean="0"/>
-              <a:t>12/15/2018</a:t>
+              <a:t>4/3/19</a:t>
             </a:fld>
             <a:endParaRPr lang="en-US"/>
           </a:p>
@@ -3726,7 +3726,7 @@
                   <a:schemeClr val="bg1"/>
                 </a:solidFill>
               </a:rPr>
-              <a:t>Model</a:t>
+              <a:t>Model(s)</a:t>
             </a:r>
             <a:endParaRPr lang="en-SG" sz="1600" dirty="0">
               <a:solidFill>
@@ -4168,101 +4168,6 @@
           </a:p>
         </p:txBody>
       </p:sp>
-      <p:sp>
-        <p:nvSpPr>
-          <p:cNvPr id="51" name="Cloud 50"/>
-          <p:cNvSpPr/>
-          <p:nvPr/>
-        </p:nvSpPr>
-        <p:spPr>
-          <a:xfrm>
-            <a:off x="2650069" y="1447800"/>
-            <a:ext cx="914400" cy="533400"/>
-          </a:xfrm>
-          <a:prstGeom prst="cloud">
-            <a:avLst/>
-          </a:prstGeom>
-          <a:solidFill>
-            <a:schemeClr val="bg1"/>
-          </a:solidFill>
-          <a:ln>
-            <a:solidFill>
-              <a:schemeClr val="tx1"/>
-            </a:solidFill>
-          </a:ln>
-        </p:spPr>
-        <p:style>
-          <a:lnRef idx="2">
-            <a:schemeClr val="accent1">
-              <a:shade val="50000"/>
-            </a:schemeClr>
-          </a:lnRef>
-          <a:fillRef idx="1">
-            <a:schemeClr val="accent1"/>
-          </a:fillRef>
-          <a:effectRef idx="0">
-            <a:schemeClr val="accent1"/>
-          </a:effectRef>
-          <a:fontRef idx="minor">
-            <a:schemeClr val="lt1"/>
-          </a:fontRef>
-        </p:style>
-        <p:txBody>
-          <a:bodyPr rtlCol="0" anchor="ctr"/>
-          <a:lstStyle/>
-          <a:p>
-            <a:pPr algn="ctr"/>
-            <a:r>
-              <a:rPr lang="en-US" sz="1400" dirty="0">
-                <a:solidFill>
-                  <a:schemeClr val="tx1"/>
-                </a:solidFill>
-              </a:rPr>
-              <a:t>Web</a:t>
-            </a:r>
-          </a:p>
-        </p:txBody>
-      </p:sp>
-      <p:cxnSp>
-        <p:nvCxnSpPr>
-          <p:cNvPr id="52" name="Elbow Connector 51"/>
-          <p:cNvCxnSpPr>
-            <a:stCxn id="2" idx="0"/>
-            <a:endCxn id="51" idx="2"/>
-          </p:cNvCxnSpPr>
-          <p:nvPr/>
-        </p:nvCxnSpPr>
-        <p:spPr>
-          <a:xfrm rot="5400000" flipH="1" flipV="1">
-            <a:off x="2222648" y="1760922"/>
-            <a:ext cx="476678" cy="383835"/>
-          </a:xfrm>
-          <a:prstGeom prst="bentConnector2">
-            <a:avLst/>
-          </a:prstGeom>
-          <a:ln w="28575">
-            <a:solidFill>
-              <a:srgbClr val="00B050"/>
-            </a:solidFill>
-            <a:prstDash val="sysDot"/>
-            <a:tailEnd type="arrow"/>
-          </a:ln>
-        </p:spPr>
-        <p:style>
-          <a:lnRef idx="1">
-            <a:schemeClr val="accent1"/>
-          </a:lnRef>
-          <a:fillRef idx="0">
-            <a:schemeClr val="accent1"/>
-          </a:fillRef>
-          <a:effectRef idx="0">
-            <a:schemeClr val="accent1"/>
-          </a:effectRef>
-          <a:fontRef idx="minor">
-            <a:schemeClr val="tx1"/>
-          </a:fontRef>
-        </p:style>
-      </p:cxnSp>
       <p:sp>
         <p:nvSpPr>
           <p:cNvPr id="23" name="Rectangle 62"/>

</xml_diff>

<commit_message>
Updated search command system test.
</commit_message>
<xml_diff>
--- a/docs/diagrams/ArchitectureDiagram.pptx
+++ b/docs/diagrams/ArchitectureDiagram.pptx
@@ -208,7 +208,7 @@
           <a:p>
             <a:fld id="{F5CC4B3F-88C1-4FFA-B1B6-F41C21DC6924}" type="datetimeFigureOut">
               <a:rPr lang="en-US" smtClean="0"/>
-              <a:t>12/15/2018</a:t>
+              <a:t>4/7/2019</a:t>
             </a:fld>
             <a:endParaRPr lang="en-US"/>
           </a:p>
@@ -654,7 +654,7 @@
           <a:p>
             <a:fld id="{78C97017-6FC3-485B-9764-EAC9E56C1D49}" type="datetimeFigureOut">
               <a:rPr lang="en-US" smtClean="0"/>
-              <a:t>12/15/2018</a:t>
+              <a:t>4/7/2019</a:t>
             </a:fld>
             <a:endParaRPr lang="en-US"/>
           </a:p>
@@ -822,7 +822,7 @@
           <a:p>
             <a:fld id="{78C97017-6FC3-485B-9764-EAC9E56C1D49}" type="datetimeFigureOut">
               <a:rPr lang="en-US" smtClean="0"/>
-              <a:t>12/15/2018</a:t>
+              <a:t>4/7/2019</a:t>
             </a:fld>
             <a:endParaRPr lang="en-US"/>
           </a:p>
@@ -1000,7 +1000,7 @@
           <a:p>
             <a:fld id="{78C97017-6FC3-485B-9764-EAC9E56C1D49}" type="datetimeFigureOut">
               <a:rPr lang="en-US" smtClean="0"/>
-              <a:t>12/15/2018</a:t>
+              <a:t>4/7/2019</a:t>
             </a:fld>
             <a:endParaRPr lang="en-US"/>
           </a:p>
@@ -1168,7 +1168,7 @@
           <a:p>
             <a:fld id="{78C97017-6FC3-485B-9764-EAC9E56C1D49}" type="datetimeFigureOut">
               <a:rPr lang="en-US" smtClean="0"/>
-              <a:t>12/15/2018</a:t>
+              <a:t>4/7/2019</a:t>
             </a:fld>
             <a:endParaRPr lang="en-US"/>
           </a:p>
@@ -1413,7 +1413,7 @@
           <a:p>
             <a:fld id="{78C97017-6FC3-485B-9764-EAC9E56C1D49}" type="datetimeFigureOut">
               <a:rPr lang="en-US" smtClean="0"/>
-              <a:t>12/15/2018</a:t>
+              <a:t>4/7/2019</a:t>
             </a:fld>
             <a:endParaRPr lang="en-US"/>
           </a:p>
@@ -1698,7 +1698,7 @@
           <a:p>
             <a:fld id="{78C97017-6FC3-485B-9764-EAC9E56C1D49}" type="datetimeFigureOut">
               <a:rPr lang="en-US" smtClean="0"/>
-              <a:t>12/15/2018</a:t>
+              <a:t>4/7/2019</a:t>
             </a:fld>
             <a:endParaRPr lang="en-US"/>
           </a:p>
@@ -2117,7 +2117,7 @@
           <a:p>
             <a:fld id="{78C97017-6FC3-485B-9764-EAC9E56C1D49}" type="datetimeFigureOut">
               <a:rPr lang="en-US" smtClean="0"/>
-              <a:t>12/15/2018</a:t>
+              <a:t>4/7/2019</a:t>
             </a:fld>
             <a:endParaRPr lang="en-US"/>
           </a:p>
@@ -2234,7 +2234,7 @@
           <a:p>
             <a:fld id="{78C97017-6FC3-485B-9764-EAC9E56C1D49}" type="datetimeFigureOut">
               <a:rPr lang="en-US" smtClean="0"/>
-              <a:t>12/15/2018</a:t>
+              <a:t>4/7/2019</a:t>
             </a:fld>
             <a:endParaRPr lang="en-US"/>
           </a:p>
@@ -2329,7 +2329,7 @@
           <a:p>
             <a:fld id="{78C97017-6FC3-485B-9764-EAC9E56C1D49}" type="datetimeFigureOut">
               <a:rPr lang="en-US" smtClean="0"/>
-              <a:t>12/15/2018</a:t>
+              <a:t>4/7/2019</a:t>
             </a:fld>
             <a:endParaRPr lang="en-US"/>
           </a:p>
@@ -2604,7 +2604,7 @@
           <a:p>
             <a:fld id="{78C97017-6FC3-485B-9764-EAC9E56C1D49}" type="datetimeFigureOut">
               <a:rPr lang="en-US" smtClean="0"/>
-              <a:t>12/15/2018</a:t>
+              <a:t>4/7/2019</a:t>
             </a:fld>
             <a:endParaRPr lang="en-US"/>
           </a:p>
@@ -2856,7 +2856,7 @@
           <a:p>
             <a:fld id="{78C97017-6FC3-485B-9764-EAC9E56C1D49}" type="datetimeFigureOut">
               <a:rPr lang="en-US" smtClean="0"/>
-              <a:t>12/15/2018</a:t>
+              <a:t>4/7/2019</a:t>
             </a:fld>
             <a:endParaRPr lang="en-US"/>
           </a:p>
@@ -3067,7 +3067,7 @@
           <a:p>
             <a:fld id="{78C97017-6FC3-485B-9764-EAC9E56C1D49}" type="datetimeFigureOut">
               <a:rPr lang="en-US" smtClean="0"/>
-              <a:t>12/15/2018</a:t>
+              <a:t>4/7/2019</a:t>
             </a:fld>
             <a:endParaRPr lang="en-US"/>
           </a:p>
@@ -4168,101 +4168,6 @@
           </a:p>
         </p:txBody>
       </p:sp>
-      <p:sp>
-        <p:nvSpPr>
-          <p:cNvPr id="51" name="Cloud 50"/>
-          <p:cNvSpPr/>
-          <p:nvPr/>
-        </p:nvSpPr>
-        <p:spPr>
-          <a:xfrm>
-            <a:off x="2650069" y="1447800"/>
-            <a:ext cx="914400" cy="533400"/>
-          </a:xfrm>
-          <a:prstGeom prst="cloud">
-            <a:avLst/>
-          </a:prstGeom>
-          <a:solidFill>
-            <a:schemeClr val="bg1"/>
-          </a:solidFill>
-          <a:ln>
-            <a:solidFill>
-              <a:schemeClr val="tx1"/>
-            </a:solidFill>
-          </a:ln>
-        </p:spPr>
-        <p:style>
-          <a:lnRef idx="2">
-            <a:schemeClr val="accent1">
-              <a:shade val="50000"/>
-            </a:schemeClr>
-          </a:lnRef>
-          <a:fillRef idx="1">
-            <a:schemeClr val="accent1"/>
-          </a:fillRef>
-          <a:effectRef idx="0">
-            <a:schemeClr val="accent1"/>
-          </a:effectRef>
-          <a:fontRef idx="minor">
-            <a:schemeClr val="lt1"/>
-          </a:fontRef>
-        </p:style>
-        <p:txBody>
-          <a:bodyPr rtlCol="0" anchor="ctr"/>
-          <a:lstStyle/>
-          <a:p>
-            <a:pPr algn="ctr"/>
-            <a:r>
-              <a:rPr lang="en-US" sz="1400" dirty="0">
-                <a:solidFill>
-                  <a:schemeClr val="tx1"/>
-                </a:solidFill>
-              </a:rPr>
-              <a:t>Web</a:t>
-            </a:r>
-          </a:p>
-        </p:txBody>
-      </p:sp>
-      <p:cxnSp>
-        <p:nvCxnSpPr>
-          <p:cNvPr id="52" name="Elbow Connector 51"/>
-          <p:cNvCxnSpPr>
-            <a:stCxn id="2" idx="0"/>
-            <a:endCxn id="51" idx="2"/>
-          </p:cNvCxnSpPr>
-          <p:nvPr/>
-        </p:nvCxnSpPr>
-        <p:spPr>
-          <a:xfrm rot="5400000" flipH="1" flipV="1">
-            <a:off x="2222648" y="1760922"/>
-            <a:ext cx="476678" cy="383835"/>
-          </a:xfrm>
-          <a:prstGeom prst="bentConnector2">
-            <a:avLst/>
-          </a:prstGeom>
-          <a:ln w="28575">
-            <a:solidFill>
-              <a:srgbClr val="00B050"/>
-            </a:solidFill>
-            <a:prstDash val="sysDot"/>
-            <a:tailEnd type="arrow"/>
-          </a:ln>
-        </p:spPr>
-        <p:style>
-          <a:lnRef idx="1">
-            <a:schemeClr val="accent1"/>
-          </a:lnRef>
-          <a:fillRef idx="0">
-            <a:schemeClr val="accent1"/>
-          </a:fillRef>
-          <a:effectRef idx="0">
-            <a:schemeClr val="accent1"/>
-          </a:effectRef>
-          <a:fontRef idx="minor">
-            <a:schemeClr val="tx1"/>
-          </a:fontRef>
-        </p:style>
-      </p:cxnSp>
       <p:sp>
         <p:nvSpPr>
           <p:cNvPr id="23" name="Rectangle 62"/>

</xml_diff>

<commit_message>
removed extra diagram, updated some diagrams in DG
</commit_message>
<xml_diff>
--- a/docs/diagrams/ArchitectureDiagram.pptx
+++ b/docs/diagrams/ArchitectureDiagram.pptx
@@ -109,7 +109,7 @@
   </p:defaultTextStyle>
   <p:extLst>
     <p:ext uri="{EFAFB233-063F-42B5-8137-9DF3F51BA10A}">
-      <p15:sldGuideLst xmlns:p15="http://schemas.microsoft.com/office/powerpoint/2012/main">
+      <p15:sldGuideLst xmlns:p15="http://schemas.microsoft.com/office/powerpoint/2012/main" xmlns="">
         <p15:guide id="1" orient="horz" pos="1488">
           <p15:clr>
             <a:srgbClr val="A4A3A4"/>
@@ -175,7 +175,7 @@
             </a:lvl1pPr>
           </a:lstStyle>
           <a:p>
-            <a:endParaRPr lang="en-US"/>
+            <a:endParaRPr lang="en-US" dirty="0"/>
           </a:p>
         </p:txBody>
       </p:sp>
@@ -208,9 +208,10 @@
           <a:p>
             <a:fld id="{F5CC4B3F-88C1-4FFA-B1B6-F41C21DC6924}" type="datetimeFigureOut">
               <a:rPr lang="en-US" smtClean="0"/>
-              <a:t>4/2/2019</a:t>
+              <a:pPr/>
+              <a:t>4/11/2019</a:t>
             </a:fld>
-            <a:endParaRPr lang="en-US"/>
+            <a:endParaRPr lang="en-US" dirty="0"/>
           </a:p>
         </p:txBody>
       </p:sp>
@@ -243,7 +244,7 @@
           <a:bodyPr vert="horz" lIns="91440" tIns="45720" rIns="91440" bIns="45720" rtlCol="0" anchor="ctr"/>
           <a:lstStyle/>
           <a:p>
-            <a:endParaRPr lang="en-US"/>
+            <a:endParaRPr lang="en-US" dirty="0"/>
           </a:p>
         </p:txBody>
       </p:sp>
@@ -333,7 +334,7 @@
             </a:lvl1pPr>
           </a:lstStyle>
           <a:p>
-            <a:endParaRPr lang="en-US"/>
+            <a:endParaRPr lang="en-US" dirty="0"/>
           </a:p>
         </p:txBody>
       </p:sp>
@@ -366,16 +367,17 @@
           <a:p>
             <a:fld id="{5A7AB025-77E3-4BD1-A2FD-B3183DBA47A3}" type="slidenum">
               <a:rPr lang="en-US" smtClean="0"/>
+              <a:pPr/>
               <a:t>‹#›</a:t>
             </a:fld>
-            <a:endParaRPr lang="en-US"/>
+            <a:endParaRPr lang="en-US" dirty="0"/>
           </a:p>
         </p:txBody>
       </p:sp>
     </p:spTree>
     <p:extLst>
       <p:ext uri="{BB962C8B-B14F-4D97-AF65-F5344CB8AC3E}">
-        <p14:creationId xmlns:p14="http://schemas.microsoft.com/office/powerpoint/2010/main" val="2023976206"/>
+        <p14:creationId xmlns:p14="http://schemas.microsoft.com/office/powerpoint/2010/main" xmlns="" val="2023976206"/>
       </p:ext>
     </p:extLst>
   </p:cSld>
@@ -654,9 +656,10 @@
           <a:p>
             <a:fld id="{78C97017-6FC3-485B-9764-EAC9E56C1D49}" type="datetimeFigureOut">
               <a:rPr lang="en-US" smtClean="0"/>
-              <a:t>4/2/2019</a:t>
+              <a:pPr/>
+              <a:t>4/11/2019</a:t>
             </a:fld>
-            <a:endParaRPr lang="en-US"/>
+            <a:endParaRPr lang="en-US" dirty="0"/>
           </a:p>
         </p:txBody>
       </p:sp>
@@ -675,7 +678,7 @@
           <a:bodyPr/>
           <a:lstStyle/>
           <a:p>
-            <a:endParaRPr lang="en-US"/>
+            <a:endParaRPr lang="en-US" dirty="0"/>
           </a:p>
         </p:txBody>
       </p:sp>
@@ -696,16 +699,17 @@
           <a:p>
             <a:fld id="{FB34683C-161B-4520-BF45-B179E228CF2A}" type="slidenum">
               <a:rPr lang="en-US" smtClean="0"/>
+              <a:pPr/>
               <a:t>‹#›</a:t>
             </a:fld>
-            <a:endParaRPr lang="en-US"/>
+            <a:endParaRPr lang="en-US" dirty="0"/>
           </a:p>
         </p:txBody>
       </p:sp>
     </p:spTree>
     <p:extLst>
       <p:ext uri="{BB962C8B-B14F-4D97-AF65-F5344CB8AC3E}">
-        <p14:creationId xmlns:p14="http://schemas.microsoft.com/office/powerpoint/2010/main" val="3246593157"/>
+        <p14:creationId xmlns:p14="http://schemas.microsoft.com/office/powerpoint/2010/main" xmlns="" val="3246593157"/>
       </p:ext>
     </p:extLst>
   </p:cSld>
@@ -822,9 +826,10 @@
           <a:p>
             <a:fld id="{78C97017-6FC3-485B-9764-EAC9E56C1D49}" type="datetimeFigureOut">
               <a:rPr lang="en-US" smtClean="0"/>
-              <a:t>4/2/2019</a:t>
+              <a:pPr/>
+              <a:t>4/11/2019</a:t>
             </a:fld>
-            <a:endParaRPr lang="en-US"/>
+            <a:endParaRPr lang="en-US" dirty="0"/>
           </a:p>
         </p:txBody>
       </p:sp>
@@ -843,7 +848,7 @@
           <a:bodyPr/>
           <a:lstStyle/>
           <a:p>
-            <a:endParaRPr lang="en-US"/>
+            <a:endParaRPr lang="en-US" dirty="0"/>
           </a:p>
         </p:txBody>
       </p:sp>
@@ -864,16 +869,17 @@
           <a:p>
             <a:fld id="{FB34683C-161B-4520-BF45-B179E228CF2A}" type="slidenum">
               <a:rPr lang="en-US" smtClean="0"/>
+              <a:pPr/>
               <a:t>‹#›</a:t>
             </a:fld>
-            <a:endParaRPr lang="en-US"/>
+            <a:endParaRPr lang="en-US" dirty="0"/>
           </a:p>
         </p:txBody>
       </p:sp>
     </p:spTree>
     <p:extLst>
       <p:ext uri="{BB962C8B-B14F-4D97-AF65-F5344CB8AC3E}">
-        <p14:creationId xmlns:p14="http://schemas.microsoft.com/office/powerpoint/2010/main" val="2707025021"/>
+        <p14:creationId xmlns:p14="http://schemas.microsoft.com/office/powerpoint/2010/main" xmlns="" val="2707025021"/>
       </p:ext>
     </p:extLst>
   </p:cSld>
@@ -1000,9 +1006,10 @@
           <a:p>
             <a:fld id="{78C97017-6FC3-485B-9764-EAC9E56C1D49}" type="datetimeFigureOut">
               <a:rPr lang="en-US" smtClean="0"/>
-              <a:t>4/2/2019</a:t>
+              <a:pPr/>
+              <a:t>4/11/2019</a:t>
             </a:fld>
-            <a:endParaRPr lang="en-US"/>
+            <a:endParaRPr lang="en-US" dirty="0"/>
           </a:p>
         </p:txBody>
       </p:sp>
@@ -1021,7 +1028,7 @@
           <a:bodyPr/>
           <a:lstStyle/>
           <a:p>
-            <a:endParaRPr lang="en-US"/>
+            <a:endParaRPr lang="en-US" dirty="0"/>
           </a:p>
         </p:txBody>
       </p:sp>
@@ -1042,16 +1049,17 @@
           <a:p>
             <a:fld id="{FB34683C-161B-4520-BF45-B179E228CF2A}" type="slidenum">
               <a:rPr lang="en-US" smtClean="0"/>
+              <a:pPr/>
               <a:t>‹#›</a:t>
             </a:fld>
-            <a:endParaRPr lang="en-US"/>
+            <a:endParaRPr lang="en-US" dirty="0"/>
           </a:p>
         </p:txBody>
       </p:sp>
     </p:spTree>
     <p:extLst>
       <p:ext uri="{BB962C8B-B14F-4D97-AF65-F5344CB8AC3E}">
-        <p14:creationId xmlns:p14="http://schemas.microsoft.com/office/powerpoint/2010/main" val="568378986"/>
+        <p14:creationId xmlns:p14="http://schemas.microsoft.com/office/powerpoint/2010/main" xmlns="" val="568378986"/>
       </p:ext>
     </p:extLst>
   </p:cSld>
@@ -1168,9 +1176,10 @@
           <a:p>
             <a:fld id="{78C97017-6FC3-485B-9764-EAC9E56C1D49}" type="datetimeFigureOut">
               <a:rPr lang="en-US" smtClean="0"/>
-              <a:t>4/2/2019</a:t>
+              <a:pPr/>
+              <a:t>4/11/2019</a:t>
             </a:fld>
-            <a:endParaRPr lang="en-US"/>
+            <a:endParaRPr lang="en-US" dirty="0"/>
           </a:p>
         </p:txBody>
       </p:sp>
@@ -1189,7 +1198,7 @@
           <a:bodyPr/>
           <a:lstStyle/>
           <a:p>
-            <a:endParaRPr lang="en-US"/>
+            <a:endParaRPr lang="en-US" dirty="0"/>
           </a:p>
         </p:txBody>
       </p:sp>
@@ -1210,16 +1219,17 @@
           <a:p>
             <a:fld id="{FB34683C-161B-4520-BF45-B179E228CF2A}" type="slidenum">
               <a:rPr lang="en-US" smtClean="0"/>
+              <a:pPr/>
               <a:t>‹#›</a:t>
             </a:fld>
-            <a:endParaRPr lang="en-US"/>
+            <a:endParaRPr lang="en-US" dirty="0"/>
           </a:p>
         </p:txBody>
       </p:sp>
     </p:spTree>
     <p:extLst>
       <p:ext uri="{BB962C8B-B14F-4D97-AF65-F5344CB8AC3E}">
-        <p14:creationId xmlns:p14="http://schemas.microsoft.com/office/powerpoint/2010/main" val="266658052"/>
+        <p14:creationId xmlns:p14="http://schemas.microsoft.com/office/powerpoint/2010/main" xmlns="" val="266658052"/>
       </p:ext>
     </p:extLst>
   </p:cSld>
@@ -1413,9 +1423,10 @@
           <a:p>
             <a:fld id="{78C97017-6FC3-485B-9764-EAC9E56C1D49}" type="datetimeFigureOut">
               <a:rPr lang="en-US" smtClean="0"/>
-              <a:t>4/2/2019</a:t>
+              <a:pPr/>
+              <a:t>4/11/2019</a:t>
             </a:fld>
-            <a:endParaRPr lang="en-US"/>
+            <a:endParaRPr lang="en-US" dirty="0"/>
           </a:p>
         </p:txBody>
       </p:sp>
@@ -1434,7 +1445,7 @@
           <a:bodyPr/>
           <a:lstStyle/>
           <a:p>
-            <a:endParaRPr lang="en-US"/>
+            <a:endParaRPr lang="en-US" dirty="0"/>
           </a:p>
         </p:txBody>
       </p:sp>
@@ -1455,16 +1466,17 @@
           <a:p>
             <a:fld id="{FB34683C-161B-4520-BF45-B179E228CF2A}" type="slidenum">
               <a:rPr lang="en-US" smtClean="0"/>
+              <a:pPr/>
               <a:t>‹#›</a:t>
             </a:fld>
-            <a:endParaRPr lang="en-US"/>
+            <a:endParaRPr lang="en-US" dirty="0"/>
           </a:p>
         </p:txBody>
       </p:sp>
     </p:spTree>
     <p:extLst>
       <p:ext uri="{BB962C8B-B14F-4D97-AF65-F5344CB8AC3E}">
-        <p14:creationId xmlns:p14="http://schemas.microsoft.com/office/powerpoint/2010/main" val="474686344"/>
+        <p14:creationId xmlns:p14="http://schemas.microsoft.com/office/powerpoint/2010/main" xmlns="" val="474686344"/>
       </p:ext>
     </p:extLst>
   </p:cSld>
@@ -1698,9 +1710,10 @@
           <a:p>
             <a:fld id="{78C97017-6FC3-485B-9764-EAC9E56C1D49}" type="datetimeFigureOut">
               <a:rPr lang="en-US" smtClean="0"/>
-              <a:t>4/2/2019</a:t>
+              <a:pPr/>
+              <a:t>4/11/2019</a:t>
             </a:fld>
-            <a:endParaRPr lang="en-US"/>
+            <a:endParaRPr lang="en-US" dirty="0"/>
           </a:p>
         </p:txBody>
       </p:sp>
@@ -1719,7 +1732,7 @@
           <a:bodyPr/>
           <a:lstStyle/>
           <a:p>
-            <a:endParaRPr lang="en-US"/>
+            <a:endParaRPr lang="en-US" dirty="0"/>
           </a:p>
         </p:txBody>
       </p:sp>
@@ -1740,16 +1753,17 @@
           <a:p>
             <a:fld id="{FB34683C-161B-4520-BF45-B179E228CF2A}" type="slidenum">
               <a:rPr lang="en-US" smtClean="0"/>
+              <a:pPr/>
               <a:t>‹#›</a:t>
             </a:fld>
-            <a:endParaRPr lang="en-US"/>
+            <a:endParaRPr lang="en-US" dirty="0"/>
           </a:p>
         </p:txBody>
       </p:sp>
     </p:spTree>
     <p:extLst>
       <p:ext uri="{BB962C8B-B14F-4D97-AF65-F5344CB8AC3E}">
-        <p14:creationId xmlns:p14="http://schemas.microsoft.com/office/powerpoint/2010/main" val="562293251"/>
+        <p14:creationId xmlns:p14="http://schemas.microsoft.com/office/powerpoint/2010/main" xmlns="" val="562293251"/>
       </p:ext>
     </p:extLst>
   </p:cSld>
@@ -2117,9 +2131,10 @@
           <a:p>
             <a:fld id="{78C97017-6FC3-485B-9764-EAC9E56C1D49}" type="datetimeFigureOut">
               <a:rPr lang="en-US" smtClean="0"/>
-              <a:t>4/2/2019</a:t>
+              <a:pPr/>
+              <a:t>4/11/2019</a:t>
             </a:fld>
-            <a:endParaRPr lang="en-US"/>
+            <a:endParaRPr lang="en-US" dirty="0"/>
           </a:p>
         </p:txBody>
       </p:sp>
@@ -2138,7 +2153,7 @@
           <a:bodyPr/>
           <a:lstStyle/>
           <a:p>
-            <a:endParaRPr lang="en-US"/>
+            <a:endParaRPr lang="en-US" dirty="0"/>
           </a:p>
         </p:txBody>
       </p:sp>
@@ -2159,16 +2174,17 @@
           <a:p>
             <a:fld id="{FB34683C-161B-4520-BF45-B179E228CF2A}" type="slidenum">
               <a:rPr lang="en-US" smtClean="0"/>
+              <a:pPr/>
               <a:t>‹#›</a:t>
             </a:fld>
-            <a:endParaRPr lang="en-US"/>
+            <a:endParaRPr lang="en-US" dirty="0"/>
           </a:p>
         </p:txBody>
       </p:sp>
     </p:spTree>
     <p:extLst>
       <p:ext uri="{BB962C8B-B14F-4D97-AF65-F5344CB8AC3E}">
-        <p14:creationId xmlns:p14="http://schemas.microsoft.com/office/powerpoint/2010/main" val="1126424250"/>
+        <p14:creationId xmlns:p14="http://schemas.microsoft.com/office/powerpoint/2010/main" xmlns="" val="1126424250"/>
       </p:ext>
     </p:extLst>
   </p:cSld>
@@ -2234,9 +2250,10 @@
           <a:p>
             <a:fld id="{78C97017-6FC3-485B-9764-EAC9E56C1D49}" type="datetimeFigureOut">
               <a:rPr lang="en-US" smtClean="0"/>
-              <a:t>4/2/2019</a:t>
+              <a:pPr/>
+              <a:t>4/11/2019</a:t>
             </a:fld>
-            <a:endParaRPr lang="en-US"/>
+            <a:endParaRPr lang="en-US" dirty="0"/>
           </a:p>
         </p:txBody>
       </p:sp>
@@ -2255,7 +2272,7 @@
           <a:bodyPr/>
           <a:lstStyle/>
           <a:p>
-            <a:endParaRPr lang="en-US"/>
+            <a:endParaRPr lang="en-US" dirty="0"/>
           </a:p>
         </p:txBody>
       </p:sp>
@@ -2276,16 +2293,17 @@
           <a:p>
             <a:fld id="{FB34683C-161B-4520-BF45-B179E228CF2A}" type="slidenum">
               <a:rPr lang="en-US" smtClean="0"/>
+              <a:pPr/>
               <a:t>‹#›</a:t>
             </a:fld>
-            <a:endParaRPr lang="en-US"/>
+            <a:endParaRPr lang="en-US" dirty="0"/>
           </a:p>
         </p:txBody>
       </p:sp>
     </p:spTree>
     <p:extLst>
       <p:ext uri="{BB962C8B-B14F-4D97-AF65-F5344CB8AC3E}">
-        <p14:creationId xmlns:p14="http://schemas.microsoft.com/office/powerpoint/2010/main" val="4159724230"/>
+        <p14:creationId xmlns:p14="http://schemas.microsoft.com/office/powerpoint/2010/main" xmlns="" val="4159724230"/>
       </p:ext>
     </p:extLst>
   </p:cSld>
@@ -2329,9 +2347,10 @@
           <a:p>
             <a:fld id="{78C97017-6FC3-485B-9764-EAC9E56C1D49}" type="datetimeFigureOut">
               <a:rPr lang="en-US" smtClean="0"/>
-              <a:t>4/2/2019</a:t>
+              <a:pPr/>
+              <a:t>4/11/2019</a:t>
             </a:fld>
-            <a:endParaRPr lang="en-US"/>
+            <a:endParaRPr lang="en-US" dirty="0"/>
           </a:p>
         </p:txBody>
       </p:sp>
@@ -2350,7 +2369,7 @@
           <a:bodyPr/>
           <a:lstStyle/>
           <a:p>
-            <a:endParaRPr lang="en-US"/>
+            <a:endParaRPr lang="en-US" dirty="0"/>
           </a:p>
         </p:txBody>
       </p:sp>
@@ -2371,16 +2390,17 @@
           <a:p>
             <a:fld id="{FB34683C-161B-4520-BF45-B179E228CF2A}" type="slidenum">
               <a:rPr lang="en-US" smtClean="0"/>
+              <a:pPr/>
               <a:t>‹#›</a:t>
             </a:fld>
-            <a:endParaRPr lang="en-US"/>
+            <a:endParaRPr lang="en-US" dirty="0"/>
           </a:p>
         </p:txBody>
       </p:sp>
     </p:spTree>
     <p:extLst>
       <p:ext uri="{BB962C8B-B14F-4D97-AF65-F5344CB8AC3E}">
-        <p14:creationId xmlns:p14="http://schemas.microsoft.com/office/powerpoint/2010/main" val="1793928710"/>
+        <p14:creationId xmlns:p14="http://schemas.microsoft.com/office/powerpoint/2010/main" xmlns="" val="1793928710"/>
       </p:ext>
     </p:extLst>
   </p:cSld>
@@ -2604,9 +2624,10 @@
           <a:p>
             <a:fld id="{78C97017-6FC3-485B-9764-EAC9E56C1D49}" type="datetimeFigureOut">
               <a:rPr lang="en-US" smtClean="0"/>
-              <a:t>4/2/2019</a:t>
+              <a:pPr/>
+              <a:t>4/11/2019</a:t>
             </a:fld>
-            <a:endParaRPr lang="en-US"/>
+            <a:endParaRPr lang="en-US" dirty="0"/>
           </a:p>
         </p:txBody>
       </p:sp>
@@ -2625,7 +2646,7 @@
           <a:bodyPr/>
           <a:lstStyle/>
           <a:p>
-            <a:endParaRPr lang="en-US"/>
+            <a:endParaRPr lang="en-US" dirty="0"/>
           </a:p>
         </p:txBody>
       </p:sp>
@@ -2646,16 +2667,17 @@
           <a:p>
             <a:fld id="{FB34683C-161B-4520-BF45-B179E228CF2A}" type="slidenum">
               <a:rPr lang="en-US" smtClean="0"/>
+              <a:pPr/>
               <a:t>‹#›</a:t>
             </a:fld>
-            <a:endParaRPr lang="en-US"/>
+            <a:endParaRPr lang="en-US" dirty="0"/>
           </a:p>
         </p:txBody>
       </p:sp>
     </p:spTree>
     <p:extLst>
       <p:ext uri="{BB962C8B-B14F-4D97-AF65-F5344CB8AC3E}">
-        <p14:creationId xmlns:p14="http://schemas.microsoft.com/office/powerpoint/2010/main" val="2076802089"/>
+        <p14:creationId xmlns:p14="http://schemas.microsoft.com/office/powerpoint/2010/main" xmlns="" val="2076802089"/>
       </p:ext>
     </p:extLst>
   </p:cSld>
@@ -2770,7 +2792,7 @@
             </a:lvl9pPr>
           </a:lstStyle>
           <a:p>
-            <a:endParaRPr lang="en-US"/>
+            <a:endParaRPr lang="en-US" dirty="0"/>
           </a:p>
         </p:txBody>
       </p:sp>
@@ -2856,9 +2878,10 @@
           <a:p>
             <a:fld id="{78C97017-6FC3-485B-9764-EAC9E56C1D49}" type="datetimeFigureOut">
               <a:rPr lang="en-US" smtClean="0"/>
-              <a:t>4/2/2019</a:t>
+              <a:pPr/>
+              <a:t>4/11/2019</a:t>
             </a:fld>
-            <a:endParaRPr lang="en-US"/>
+            <a:endParaRPr lang="en-US" dirty="0"/>
           </a:p>
         </p:txBody>
       </p:sp>
@@ -2877,7 +2900,7 @@
           <a:bodyPr/>
           <a:lstStyle/>
           <a:p>
-            <a:endParaRPr lang="en-US"/>
+            <a:endParaRPr lang="en-US" dirty="0"/>
           </a:p>
         </p:txBody>
       </p:sp>
@@ -2898,16 +2921,17 @@
           <a:p>
             <a:fld id="{FB34683C-161B-4520-BF45-B179E228CF2A}" type="slidenum">
               <a:rPr lang="en-US" smtClean="0"/>
+              <a:pPr/>
               <a:t>‹#›</a:t>
             </a:fld>
-            <a:endParaRPr lang="en-US"/>
+            <a:endParaRPr lang="en-US" dirty="0"/>
           </a:p>
         </p:txBody>
       </p:sp>
     </p:spTree>
     <p:extLst>
       <p:ext uri="{BB962C8B-B14F-4D97-AF65-F5344CB8AC3E}">
-        <p14:creationId xmlns:p14="http://schemas.microsoft.com/office/powerpoint/2010/main" val="201835938"/>
+        <p14:creationId xmlns:p14="http://schemas.microsoft.com/office/powerpoint/2010/main" xmlns="" val="201835938"/>
       </p:ext>
     </p:extLst>
   </p:cSld>
@@ -3067,9 +3091,10 @@
           <a:p>
             <a:fld id="{78C97017-6FC3-485B-9764-EAC9E56C1D49}" type="datetimeFigureOut">
               <a:rPr lang="en-US" smtClean="0"/>
-              <a:t>4/2/2019</a:t>
+              <a:pPr/>
+              <a:t>4/11/2019</a:t>
             </a:fld>
-            <a:endParaRPr lang="en-US"/>
+            <a:endParaRPr lang="en-US" dirty="0"/>
           </a:p>
         </p:txBody>
       </p:sp>
@@ -3106,7 +3131,7 @@
             </a:lvl1pPr>
           </a:lstStyle>
           <a:p>
-            <a:endParaRPr lang="en-US"/>
+            <a:endParaRPr lang="en-US" dirty="0"/>
           </a:p>
         </p:txBody>
       </p:sp>
@@ -3145,16 +3170,17 @@
           <a:p>
             <a:fld id="{FB34683C-161B-4520-BF45-B179E228CF2A}" type="slidenum">
               <a:rPr lang="en-US" smtClean="0"/>
+              <a:pPr/>
               <a:t>‹#›</a:t>
             </a:fld>
-            <a:endParaRPr lang="en-US"/>
+            <a:endParaRPr lang="en-US" dirty="0"/>
           </a:p>
         </p:txBody>
       </p:sp>
     </p:spTree>
     <p:extLst>
       <p:ext uri="{BB962C8B-B14F-4D97-AF65-F5344CB8AC3E}">
-        <p14:creationId xmlns:p14="http://schemas.microsoft.com/office/powerpoint/2010/main" val="2341400630"/>
+        <p14:creationId xmlns:p14="http://schemas.microsoft.com/office/powerpoint/2010/main" xmlns="" val="2341400630"/>
       </p:ext>
     </p:extLst>
   </p:cSld>
@@ -3662,7 +3688,7 @@
           <a:p>
             <a:pPr algn="ctr"/>
             <a:r>
-              <a:rPr lang="en-US" sz="1600" dirty="0" err="1">
+              <a:rPr lang="en-US" sz="1600" dirty="0">
                 <a:solidFill>
                   <a:schemeClr val="bg1"/>
                 </a:solidFill>
@@ -3992,7 +4018,7 @@
           <a:lstStyle/>
           <a:p>
             <a:pPr algn="ctr"/>
-            <a:endParaRPr lang="en-US"/>
+            <a:endParaRPr lang="en-US" dirty="0"/>
           </a:p>
         </p:txBody>
       </p:sp>
@@ -4118,7 +4144,7 @@
           <a:lstStyle/>
           <a:p>
             <a:pPr algn="ctr"/>
-            <a:endParaRPr lang="en-US"/>
+            <a:endParaRPr lang="en-US" dirty="0"/>
           </a:p>
         </p:txBody>
       </p:sp>
@@ -4577,7 +4603,7 @@
           <p:cNvPr id="6" name="TextBox 5">
             <a:extLst>
               <a:ext uri="{FF2B5EF4-FFF2-40B4-BE49-F238E27FC236}">
-                <a16:creationId xmlns:a16="http://schemas.microsoft.com/office/drawing/2014/main" id="{0C0972AA-0274-4D06-BE1B-91A27AA25F64}"/>
+                <a16:creationId xmlns:a16="http://schemas.microsoft.com/office/drawing/2014/main" xmlns="" id="{0C0972AA-0274-4D06-BE1B-91A27AA25F64}"/>
               </a:ext>
             </a:extLst>
           </p:cNvPr>
@@ -4621,7 +4647,7 @@
           <p:cNvPr id="42" name="TextBox 41">
             <a:extLst>
               <a:ext uri="{FF2B5EF4-FFF2-40B4-BE49-F238E27FC236}">
-                <a16:creationId xmlns:a16="http://schemas.microsoft.com/office/drawing/2014/main" id="{B5B78D01-C55F-4D6E-A1FC-770ED95E6AE3}"/>
+                <a16:creationId xmlns:a16="http://schemas.microsoft.com/office/drawing/2014/main" xmlns="" id="{B5B78D01-C55F-4D6E-A1FC-770ED95E6AE3}"/>
               </a:ext>
             </a:extLst>
           </p:cNvPr>
@@ -4656,7 +4682,7 @@
     </p:spTree>
     <p:extLst>
       <p:ext uri="{BB962C8B-B14F-4D97-AF65-F5344CB8AC3E}">
-        <p14:creationId xmlns:p14="http://schemas.microsoft.com/office/powerpoint/2010/main" val="1981432603"/>
+        <p14:creationId xmlns:p14="http://schemas.microsoft.com/office/powerpoint/2010/main" xmlns="" val="1981432603"/>
       </p:ext>
     </p:extLst>
   </p:cSld>

</xml_diff>

<commit_message>
Update DG component diagrams
</commit_message>
<xml_diff>
--- a/docs/diagrams/ArchitectureDiagram.pptx
+++ b/docs/diagrams/ArchitectureDiagram.pptx
@@ -208,7 +208,7 @@
           <a:p>
             <a:fld id="{F5CC4B3F-88C1-4FFA-B1B6-F41C21DC6924}" type="datetimeFigureOut">
               <a:rPr lang="en-US" smtClean="0"/>
-              <a:t>3/31/2019</a:t>
+              <a:t>4/14/2019</a:t>
             </a:fld>
             <a:endParaRPr lang="en-US"/>
           </a:p>
@@ -654,7 +654,7 @@
           <a:p>
             <a:fld id="{78C97017-6FC3-485B-9764-EAC9E56C1D49}" type="datetimeFigureOut">
               <a:rPr lang="en-US" smtClean="0"/>
-              <a:t>3/31/2019</a:t>
+              <a:t>4/14/2019</a:t>
             </a:fld>
             <a:endParaRPr lang="en-US"/>
           </a:p>
@@ -822,7 +822,7 @@
           <a:p>
             <a:fld id="{78C97017-6FC3-485B-9764-EAC9E56C1D49}" type="datetimeFigureOut">
               <a:rPr lang="en-US" smtClean="0"/>
-              <a:t>3/31/2019</a:t>
+              <a:t>4/14/2019</a:t>
             </a:fld>
             <a:endParaRPr lang="en-US"/>
           </a:p>
@@ -1000,7 +1000,7 @@
           <a:p>
             <a:fld id="{78C97017-6FC3-485B-9764-EAC9E56C1D49}" type="datetimeFigureOut">
               <a:rPr lang="en-US" smtClean="0"/>
-              <a:t>3/31/2019</a:t>
+              <a:t>4/14/2019</a:t>
             </a:fld>
             <a:endParaRPr lang="en-US"/>
           </a:p>
@@ -1168,7 +1168,7 @@
           <a:p>
             <a:fld id="{78C97017-6FC3-485B-9764-EAC9E56C1D49}" type="datetimeFigureOut">
               <a:rPr lang="en-US" smtClean="0"/>
-              <a:t>3/31/2019</a:t>
+              <a:t>4/14/2019</a:t>
             </a:fld>
             <a:endParaRPr lang="en-US"/>
           </a:p>
@@ -1413,7 +1413,7 @@
           <a:p>
             <a:fld id="{78C97017-6FC3-485B-9764-EAC9E56C1D49}" type="datetimeFigureOut">
               <a:rPr lang="en-US" smtClean="0"/>
-              <a:t>3/31/2019</a:t>
+              <a:t>4/14/2019</a:t>
             </a:fld>
             <a:endParaRPr lang="en-US"/>
           </a:p>
@@ -1698,7 +1698,7 @@
           <a:p>
             <a:fld id="{78C97017-6FC3-485B-9764-EAC9E56C1D49}" type="datetimeFigureOut">
               <a:rPr lang="en-US" smtClean="0"/>
-              <a:t>3/31/2019</a:t>
+              <a:t>4/14/2019</a:t>
             </a:fld>
             <a:endParaRPr lang="en-US"/>
           </a:p>
@@ -2117,7 +2117,7 @@
           <a:p>
             <a:fld id="{78C97017-6FC3-485B-9764-EAC9E56C1D49}" type="datetimeFigureOut">
               <a:rPr lang="en-US" smtClean="0"/>
-              <a:t>3/31/2019</a:t>
+              <a:t>4/14/2019</a:t>
             </a:fld>
             <a:endParaRPr lang="en-US"/>
           </a:p>
@@ -2234,7 +2234,7 @@
           <a:p>
             <a:fld id="{78C97017-6FC3-485B-9764-EAC9E56C1D49}" type="datetimeFigureOut">
               <a:rPr lang="en-US" smtClean="0"/>
-              <a:t>3/31/2019</a:t>
+              <a:t>4/14/2019</a:t>
             </a:fld>
             <a:endParaRPr lang="en-US"/>
           </a:p>
@@ -2329,7 +2329,7 @@
           <a:p>
             <a:fld id="{78C97017-6FC3-485B-9764-EAC9E56C1D49}" type="datetimeFigureOut">
               <a:rPr lang="en-US" smtClean="0"/>
-              <a:t>3/31/2019</a:t>
+              <a:t>4/14/2019</a:t>
             </a:fld>
             <a:endParaRPr lang="en-US"/>
           </a:p>
@@ -2604,7 +2604,7 @@
           <a:p>
             <a:fld id="{78C97017-6FC3-485B-9764-EAC9E56C1D49}" type="datetimeFigureOut">
               <a:rPr lang="en-US" smtClean="0"/>
-              <a:t>3/31/2019</a:t>
+              <a:t>4/14/2019</a:t>
             </a:fld>
             <a:endParaRPr lang="en-US"/>
           </a:p>
@@ -2856,7 +2856,7 @@
           <a:p>
             <a:fld id="{78C97017-6FC3-485B-9764-EAC9E56C1D49}" type="datetimeFigureOut">
               <a:rPr lang="en-US" smtClean="0"/>
-              <a:t>3/31/2019</a:t>
+              <a:t>4/14/2019</a:t>
             </a:fld>
             <a:endParaRPr lang="en-US"/>
           </a:p>
@@ -3067,7 +3067,7 @@
           <a:p>
             <a:fld id="{78C97017-6FC3-485B-9764-EAC9E56C1D49}" type="datetimeFigureOut">
               <a:rPr lang="en-US" smtClean="0"/>
-              <a:t>3/31/2019</a:t>
+              <a:t>4/14/2019</a:t>
             </a:fld>
             <a:endParaRPr lang="en-US"/>
           </a:p>
@@ -3450,8 +3450,8 @@
         </p:nvSpPr>
         <p:spPr>
           <a:xfrm>
-            <a:off x="990600" y="1828800"/>
-            <a:ext cx="5715000" cy="3505196"/>
+            <a:off x="990600" y="1524002"/>
+            <a:ext cx="5715000" cy="3809994"/>
           </a:xfrm>
           <a:prstGeom prst="roundRect">
             <a:avLst>
@@ -3504,8 +3504,8 @@
         </p:nvSpPr>
         <p:spPr>
           <a:xfrm flipH="1">
-            <a:off x="1318681" y="2057402"/>
-            <a:ext cx="609602" cy="2028237"/>
+            <a:off x="1318681" y="1819212"/>
+            <a:ext cx="609602" cy="2266427"/>
           </a:xfrm>
           <a:prstGeom prst="roundRect">
             <a:avLst/>
@@ -3563,7 +3563,7 @@
         </p:nvSpPr>
         <p:spPr>
           <a:xfrm>
-            <a:off x="2371385" y="2828876"/>
+            <a:off x="2371385" y="2678017"/>
             <a:ext cx="1690496" cy="552022"/>
           </a:xfrm>
           <a:prstGeom prst="roundRect">
@@ -3622,7 +3622,7 @@
         </p:nvSpPr>
         <p:spPr>
           <a:xfrm>
-            <a:off x="4588928" y="2831063"/>
+            <a:off x="4588928" y="2680204"/>
             <a:ext cx="1447800" cy="552022"/>
           </a:xfrm>
           <a:prstGeom prst="roundRect">
@@ -3685,7 +3685,7 @@
         </p:nvSpPr>
         <p:spPr>
           <a:xfrm>
-            <a:off x="2371385" y="3685698"/>
+            <a:off x="2371385" y="3534839"/>
             <a:ext cx="1690495" cy="550800"/>
           </a:xfrm>
           <a:prstGeom prst="roundRect">
@@ -3741,13 +3741,15 @@
           <p:cNvPr id="10" name="Straight Arrow Connector 9"/>
           <p:cNvCxnSpPr>
             <a:cxnSpLocks/>
+            <a:stCxn id="2" idx="1"/>
+            <a:endCxn id="3" idx="1"/>
           </p:cNvCxnSpPr>
           <p:nvPr/>
         </p:nvCxnSpPr>
         <p:spPr>
           <a:xfrm>
-            <a:off x="1928283" y="3104887"/>
-            <a:ext cx="419099" cy="0"/>
+            <a:off x="1928283" y="2952426"/>
+            <a:ext cx="443102" cy="1602"/>
           </a:xfrm>
           <a:prstGeom prst="straightConnector1">
             <a:avLst/>
@@ -3779,13 +3781,14 @@
           <p:cNvPr id="12" name="Straight Arrow Connector 11"/>
           <p:cNvCxnSpPr>
             <a:cxnSpLocks/>
+            <a:endCxn id="5" idx="1"/>
           </p:cNvCxnSpPr>
           <p:nvPr/>
         </p:nvCxnSpPr>
         <p:spPr>
           <a:xfrm>
             <a:off x="1928283" y="3810000"/>
-            <a:ext cx="419099" cy="0"/>
+            <a:ext cx="443102" cy="239"/>
           </a:xfrm>
           <a:prstGeom prst="straightConnector1">
             <a:avLst/>
@@ -3824,7 +3827,7 @@
         </p:nvCxnSpPr>
         <p:spPr>
           <a:xfrm>
-            <a:off x="3216633" y="3380898"/>
+            <a:off x="3216633" y="3230039"/>
             <a:ext cx="0" cy="304800"/>
           </a:xfrm>
           <a:prstGeom prst="straightConnector1">
@@ -3864,7 +3867,7 @@
         </p:nvCxnSpPr>
         <p:spPr>
           <a:xfrm>
-            <a:off x="4061881" y="3104887"/>
+            <a:off x="4061881" y="2954028"/>
             <a:ext cx="527047" cy="2187"/>
           </a:xfrm>
           <a:prstGeom prst="straightConnector1">
@@ -4012,7 +4015,7 @@
         </p:nvGrpSpPr>
         <p:grpSpPr>
           <a:xfrm>
-            <a:off x="6036728" y="2876287"/>
+            <a:off x="6036728" y="2725428"/>
             <a:ext cx="1507072" cy="457200"/>
             <a:chOff x="6218754" y="2876287"/>
             <a:chExt cx="1507072" cy="457200"/>
@@ -4156,105 +4159,6 @@
           </p:txBody>
         </p:sp>
       </p:grpSp>
-      <p:sp>
-        <p:nvSpPr>
-          <p:cNvPr id="51" name="Cloud 50"/>
-          <p:cNvSpPr/>
-          <p:nvPr/>
-        </p:nvSpPr>
-        <p:spPr>
-          <a:xfrm>
-            <a:off x="-1371600" y="1401111"/>
-            <a:ext cx="914400" cy="533400"/>
-          </a:xfrm>
-          <a:prstGeom prst="cloud">
-            <a:avLst/>
-          </a:prstGeom>
-          <a:solidFill>
-            <a:schemeClr val="bg1"/>
-          </a:solidFill>
-          <a:ln>
-            <a:solidFill>
-              <a:schemeClr val="tx1"/>
-            </a:solidFill>
-          </a:ln>
-        </p:spPr>
-        <p:style>
-          <a:lnRef idx="2">
-            <a:schemeClr val="accent1">
-              <a:shade val="50000"/>
-            </a:schemeClr>
-          </a:lnRef>
-          <a:fillRef idx="1">
-            <a:schemeClr val="accent1"/>
-          </a:fillRef>
-          <a:effectRef idx="0">
-            <a:schemeClr val="accent1"/>
-          </a:effectRef>
-          <a:fontRef idx="minor">
-            <a:schemeClr val="lt1"/>
-          </a:fontRef>
-        </p:style>
-        <p:txBody>
-          <a:bodyPr rtlCol="0" anchor="ctr"/>
-          <a:lstStyle/>
-          <a:p>
-            <a:pPr algn="ctr"/>
-            <a:r>
-              <a:rPr lang="en-US" sz="1400" dirty="0">
-                <a:solidFill>
-                  <a:schemeClr val="tx1"/>
-                </a:solidFill>
-              </a:rPr>
-              <a:t>Web</a:t>
-            </a:r>
-          </a:p>
-        </p:txBody>
-      </p:sp>
-      <p:cxnSp>
-        <p:nvCxnSpPr>
-          <p:cNvPr id="52" name="Elbow Connector 51"/>
-          <p:cNvCxnSpPr>
-            <a:cxnSpLocks/>
-            <a:stCxn id="51" idx="1"/>
-            <a:endCxn id="51" idx="2"/>
-          </p:cNvCxnSpPr>
-          <p:nvPr/>
-        </p:nvCxnSpPr>
-        <p:spPr>
-          <a:xfrm rot="5400000" flipH="1">
-            <a:off x="-1274648" y="1573695"/>
-            <a:ext cx="266132" cy="454364"/>
-          </a:xfrm>
-          <a:prstGeom prst="bentConnector4">
-            <a:avLst>
-              <a:gd name="adj1" fmla="val -86111"/>
-              <a:gd name="adj2" fmla="val 150936"/>
-            </a:avLst>
-          </a:prstGeom>
-          <a:ln w="28575">
-            <a:solidFill>
-              <a:srgbClr val="00B050"/>
-            </a:solidFill>
-            <a:prstDash val="sysDot"/>
-            <a:tailEnd type="arrow"/>
-          </a:ln>
-        </p:spPr>
-        <p:style>
-          <a:lnRef idx="1">
-            <a:schemeClr val="accent1"/>
-          </a:lnRef>
-          <a:fillRef idx="0">
-            <a:schemeClr val="accent1"/>
-          </a:fillRef>
-          <a:effectRef idx="0">
-            <a:schemeClr val="accent1"/>
-          </a:effectRef>
-          <a:fontRef idx="minor">
-            <a:schemeClr val="tx1"/>
-          </a:fontRef>
-        </p:style>
-      </p:cxnSp>
       <p:grpSp>
         <p:nvGrpSpPr>
           <p:cNvPr id="79" name="main">
@@ -4776,18 +4680,18 @@
         </p:nvSpPr>
         <p:spPr>
           <a:xfrm>
-            <a:off x="2371385" y="1970071"/>
+            <a:off x="2371385" y="1819212"/>
             <a:ext cx="1690496" cy="550800"/>
           </a:xfrm>
           <a:prstGeom prst="roundRect">
             <a:avLst/>
           </a:prstGeom>
           <a:solidFill>
-            <a:srgbClr val="597B78"/>
+            <a:srgbClr val="0E5B5B"/>
           </a:solidFill>
           <a:ln w="19050">
             <a:solidFill>
-              <a:srgbClr val="597B78"/>
+              <a:srgbClr val="0E5B5B"/>
             </a:solidFill>
           </a:ln>
           <a:effectLst/>
@@ -4845,7 +4749,7 @@
         </p:nvCxnSpPr>
         <p:spPr>
           <a:xfrm flipV="1">
-            <a:off x="3216633" y="2520871"/>
+            <a:off x="3216633" y="2370012"/>
             <a:ext cx="0" cy="308005"/>
           </a:xfrm>
           <a:prstGeom prst="straightConnector1">
@@ -4884,13 +4788,14 @@
           </p:cNvPr>
           <p:cNvCxnSpPr>
             <a:cxnSpLocks/>
+            <a:endCxn id="41" idx="1"/>
           </p:cNvCxnSpPr>
           <p:nvPr/>
         </p:nvCxnSpPr>
         <p:spPr>
-          <a:xfrm>
-            <a:off x="1924051" y="2362200"/>
-            <a:ext cx="423331" cy="0"/>
+          <a:xfrm flipV="1">
+            <a:off x="1928283" y="2094612"/>
+            <a:ext cx="443102" cy="239"/>
           </a:xfrm>
           <a:prstGeom prst="straightConnector1">
             <a:avLst/>

</xml_diff>

<commit_message>
add preset commands to dev guide
</commit_message>
<xml_diff>
--- a/docs/diagrams/ArchitectureDiagram.pptx
+++ b/docs/diagrams/ArchitectureDiagram.pptx
@@ -208,7 +208,7 @@
           <a:p>
             <a:fld id="{F5CC4B3F-88C1-4FFA-B1B6-F41C21DC6924}" type="datetimeFigureOut">
               <a:rPr lang="en-US" smtClean="0"/>
-              <a:t>3/30/2019</a:t>
+              <a:t>4/14/19</a:t>
             </a:fld>
             <a:endParaRPr lang="en-US"/>
           </a:p>
@@ -654,7 +654,7 @@
           <a:p>
             <a:fld id="{78C97017-6FC3-485B-9764-EAC9E56C1D49}" type="datetimeFigureOut">
               <a:rPr lang="en-US" smtClean="0"/>
-              <a:t>3/30/2019</a:t>
+              <a:t>4/14/19</a:t>
             </a:fld>
             <a:endParaRPr lang="en-US"/>
           </a:p>
@@ -822,7 +822,7 @@
           <a:p>
             <a:fld id="{78C97017-6FC3-485B-9764-EAC9E56C1D49}" type="datetimeFigureOut">
               <a:rPr lang="en-US" smtClean="0"/>
-              <a:t>3/30/2019</a:t>
+              <a:t>4/14/19</a:t>
             </a:fld>
             <a:endParaRPr lang="en-US"/>
           </a:p>
@@ -1000,7 +1000,7 @@
           <a:p>
             <a:fld id="{78C97017-6FC3-485B-9764-EAC9E56C1D49}" type="datetimeFigureOut">
               <a:rPr lang="en-US" smtClean="0"/>
-              <a:t>3/30/2019</a:t>
+              <a:t>4/14/19</a:t>
             </a:fld>
             <a:endParaRPr lang="en-US"/>
           </a:p>
@@ -1168,7 +1168,7 @@
           <a:p>
             <a:fld id="{78C97017-6FC3-485B-9764-EAC9E56C1D49}" type="datetimeFigureOut">
               <a:rPr lang="en-US" smtClean="0"/>
-              <a:t>3/30/2019</a:t>
+              <a:t>4/14/19</a:t>
             </a:fld>
             <a:endParaRPr lang="en-US"/>
           </a:p>
@@ -1413,7 +1413,7 @@
           <a:p>
             <a:fld id="{78C97017-6FC3-485B-9764-EAC9E56C1D49}" type="datetimeFigureOut">
               <a:rPr lang="en-US" smtClean="0"/>
-              <a:t>3/30/2019</a:t>
+              <a:t>4/14/19</a:t>
             </a:fld>
             <a:endParaRPr lang="en-US"/>
           </a:p>
@@ -1698,7 +1698,7 @@
           <a:p>
             <a:fld id="{78C97017-6FC3-485B-9764-EAC9E56C1D49}" type="datetimeFigureOut">
               <a:rPr lang="en-US" smtClean="0"/>
-              <a:t>3/30/2019</a:t>
+              <a:t>4/14/19</a:t>
             </a:fld>
             <a:endParaRPr lang="en-US"/>
           </a:p>
@@ -2117,7 +2117,7 @@
           <a:p>
             <a:fld id="{78C97017-6FC3-485B-9764-EAC9E56C1D49}" type="datetimeFigureOut">
               <a:rPr lang="en-US" smtClean="0"/>
-              <a:t>3/30/2019</a:t>
+              <a:t>4/14/19</a:t>
             </a:fld>
             <a:endParaRPr lang="en-US"/>
           </a:p>
@@ -2234,7 +2234,7 @@
           <a:p>
             <a:fld id="{78C97017-6FC3-485B-9764-EAC9E56C1D49}" type="datetimeFigureOut">
               <a:rPr lang="en-US" smtClean="0"/>
-              <a:t>3/30/2019</a:t>
+              <a:t>4/14/19</a:t>
             </a:fld>
             <a:endParaRPr lang="en-US"/>
           </a:p>
@@ -2329,7 +2329,7 @@
           <a:p>
             <a:fld id="{78C97017-6FC3-485B-9764-EAC9E56C1D49}" type="datetimeFigureOut">
               <a:rPr lang="en-US" smtClean="0"/>
-              <a:t>3/30/2019</a:t>
+              <a:t>4/14/19</a:t>
             </a:fld>
             <a:endParaRPr lang="en-US"/>
           </a:p>
@@ -2604,7 +2604,7 @@
           <a:p>
             <a:fld id="{78C97017-6FC3-485B-9764-EAC9E56C1D49}" type="datetimeFigureOut">
               <a:rPr lang="en-US" smtClean="0"/>
-              <a:t>3/30/2019</a:t>
+              <a:t>4/14/19</a:t>
             </a:fld>
             <a:endParaRPr lang="en-US"/>
           </a:p>
@@ -2856,7 +2856,7 @@
           <a:p>
             <a:fld id="{78C97017-6FC3-485B-9764-EAC9E56C1D49}" type="datetimeFigureOut">
               <a:rPr lang="en-US" smtClean="0"/>
-              <a:t>3/30/2019</a:t>
+              <a:t>4/14/19</a:t>
             </a:fld>
             <a:endParaRPr lang="en-US"/>
           </a:p>
@@ -3067,7 +3067,7 @@
           <a:p>
             <a:fld id="{78C97017-6FC3-485B-9764-EAC9E56C1D49}" type="datetimeFigureOut">
               <a:rPr lang="en-US" smtClean="0"/>
-              <a:t>3/30/2019</a:t>
+              <a:t>4/14/19</a:t>
             </a:fld>
             <a:endParaRPr lang="en-US"/>
           </a:p>
@@ -3450,8 +3450,8 @@
         </p:nvSpPr>
         <p:spPr>
           <a:xfrm>
-            <a:off x="1636188" y="2057400"/>
-            <a:ext cx="5700181" cy="2667000"/>
+            <a:off x="1636188" y="1600200"/>
+            <a:ext cx="5700181" cy="3962400"/>
           </a:xfrm>
           <a:prstGeom prst="roundRect">
             <a:avLst>
@@ -3504,7 +3504,7 @@
         </p:nvSpPr>
         <p:spPr>
           <a:xfrm flipH="1">
-            <a:off x="1959335" y="2109105"/>
+            <a:off x="1936204" y="2526846"/>
             <a:ext cx="609602" cy="1294917"/>
           </a:xfrm>
           <a:prstGeom prst="roundRect">
@@ -3563,7 +3563,7 @@
         </p:nvSpPr>
         <p:spPr>
           <a:xfrm>
-            <a:off x="3043769" y="2473675"/>
+            <a:off x="3032673" y="2863700"/>
             <a:ext cx="1295400" cy="552022"/>
           </a:xfrm>
           <a:prstGeom prst="roundRect">
@@ -3744,7 +3744,7 @@
         </p:nvSpPr>
         <p:spPr>
           <a:xfrm>
-            <a:off x="3217846" y="4131994"/>
+            <a:off x="3276600" y="5003977"/>
             <a:ext cx="2658531" cy="444640"/>
           </a:xfrm>
           <a:prstGeom prst="roundRect">
@@ -3809,7 +3809,7 @@
         </p:nvCxnSpPr>
         <p:spPr>
           <a:xfrm>
-            <a:off x="2575990" y="2756563"/>
+            <a:off x="2545806" y="3138072"/>
             <a:ext cx="474129" cy="0"/>
           </a:xfrm>
           <a:prstGeom prst="straightConnector1">
@@ -3848,9 +3848,9 @@
           <p:nvPr/>
         </p:nvCxnSpPr>
         <p:spPr>
-          <a:xfrm>
-            <a:off x="4339169" y="2749686"/>
-            <a:ext cx="648216" cy="388386"/>
+          <a:xfrm flipV="1">
+            <a:off x="4328073" y="3138072"/>
+            <a:ext cx="659312" cy="1639"/>
           </a:xfrm>
           <a:prstGeom prst="straightConnector1">
             <a:avLst/>
@@ -3882,15 +3882,14 @@
           <p:cNvPr id="16" name="Straight Arrow Connector 15"/>
           <p:cNvCxnSpPr>
             <a:cxnSpLocks/>
-            <a:stCxn id="3" idx="3"/>
             <a:endCxn id="4" idx="1"/>
           </p:cNvCxnSpPr>
           <p:nvPr/>
         </p:nvCxnSpPr>
         <p:spPr>
           <a:xfrm flipV="1">
-            <a:off x="4339169" y="2458878"/>
-            <a:ext cx="648216" cy="290808"/>
+            <a:off x="4326331" y="2458878"/>
+            <a:ext cx="661054" cy="531086"/>
           </a:xfrm>
           <a:prstGeom prst="straightConnector1">
             <a:avLst/>
@@ -3925,7 +3924,7 @@
         </p:nvSpPr>
         <p:spPr>
           <a:xfrm>
-            <a:off x="1200157" y="2667000"/>
+            <a:off x="1200677" y="2944270"/>
             <a:ext cx="381000" cy="381000"/>
           </a:xfrm>
           <a:prstGeom prst="smileyFace">
@@ -3973,7 +3972,7 @@
         </p:nvCxnSpPr>
         <p:spPr>
           <a:xfrm flipV="1">
-            <a:off x="1636188" y="2819400"/>
+            <a:off x="1615226" y="3134770"/>
             <a:ext cx="273050" cy="1"/>
           </a:xfrm>
           <a:prstGeom prst="straightConnector1">
@@ -4010,7 +4009,7 @@
         </p:nvSpPr>
         <p:spPr>
           <a:xfrm>
-            <a:off x="7849078" y="2610122"/>
+            <a:off x="7816214" y="2279766"/>
             <a:ext cx="381000" cy="381000"/>
           </a:xfrm>
           <a:prstGeom prst="foldedCorner">
@@ -4058,7 +4057,7 @@
         </p:nvSpPr>
         <p:spPr>
           <a:xfrm>
-            <a:off x="7855815" y="3635446"/>
+            <a:off x="7843855" y="2975326"/>
             <a:ext cx="381000" cy="381000"/>
           </a:xfrm>
           <a:prstGeom prst="foldedCorner">
@@ -4106,7 +4105,7 @@
         </p:nvSpPr>
         <p:spPr>
           <a:xfrm flipH="1">
-            <a:off x="1964269" y="3959459"/>
+            <a:off x="2023023" y="4831442"/>
             <a:ext cx="778931" cy="570908"/>
           </a:xfrm>
           <a:prstGeom prst="roundRect">
@@ -4167,7 +4166,7 @@
         </p:nvCxnSpPr>
         <p:spPr>
           <a:xfrm>
-            <a:off x="2743200" y="4244913"/>
+            <a:off x="2801954" y="5116896"/>
             <a:ext cx="249770" cy="0"/>
           </a:xfrm>
           <a:prstGeom prst="straightConnector1">
@@ -4199,13 +4198,15 @@
       <p:cxnSp>
         <p:nvCxnSpPr>
           <p:cNvPr id="39" name="Straight Arrow Connector 38"/>
-          <p:cNvCxnSpPr/>
+          <p:cNvCxnSpPr>
+            <a:cxnSpLocks/>
+          </p:cNvCxnSpPr>
           <p:nvPr/>
         </p:nvCxnSpPr>
         <p:spPr>
-          <a:xfrm flipV="1">
-            <a:off x="2353734" y="3697061"/>
-            <a:ext cx="0" cy="301859"/>
+          <a:xfrm flipH="1" flipV="1">
+            <a:off x="2362200" y="4112691"/>
+            <a:ext cx="50288" cy="758213"/>
           </a:xfrm>
           <a:prstGeom prst="straightConnector1">
             <a:avLst/>
@@ -4241,7 +4242,7 @@
         </p:nvSpPr>
         <p:spPr>
           <a:xfrm>
-            <a:off x="5888569" y="3515641"/>
+            <a:off x="5947323" y="4387624"/>
             <a:ext cx="1219201" cy="533400"/>
           </a:xfrm>
           <a:prstGeom prst="ellipse">
@@ -4317,7 +4318,7 @@
         </p:nvCxnSpPr>
         <p:spPr>
           <a:xfrm rot="5400000">
-            <a:off x="6034638" y="3890781"/>
+            <a:off x="6093392" y="4762764"/>
             <a:ext cx="305273" cy="621793"/>
           </a:xfrm>
           <a:prstGeom prst="bentConnector2">
@@ -4365,7 +4366,7 @@
         <p:spPr>
           <a:xfrm>
             <a:off x="6435185" y="2458878"/>
-            <a:ext cx="1413893" cy="341744"/>
+            <a:ext cx="1381029" cy="11388"/>
           </a:xfrm>
           <a:prstGeom prst="straightConnector1">
             <a:avLst/>
@@ -4413,7 +4414,7 @@
         <p:spPr>
           <a:xfrm>
             <a:off x="6423025" y="3138072"/>
-            <a:ext cx="1432790" cy="687874"/>
+            <a:ext cx="1420830" cy="27754"/>
           </a:xfrm>
           <a:prstGeom prst="straightConnector1">
             <a:avLst/>
@@ -4454,8 +4455,8 @@
         </p:nvSpPr>
         <p:spPr>
           <a:xfrm>
-            <a:off x="7507813" y="2182867"/>
-            <a:ext cx="1035598" cy="2062046"/>
+            <a:off x="7474949" y="1852511"/>
+            <a:ext cx="1035598" cy="1743721"/>
           </a:xfrm>
           <a:prstGeom prst="roundRect">
             <a:avLst/>
@@ -4510,7 +4511,7 @@
         </p:nvSpPr>
         <p:spPr>
           <a:xfrm>
-            <a:off x="7580472" y="1854356"/>
+            <a:off x="7547608" y="1524000"/>
             <a:ext cx="895502" cy="369332"/>
           </a:xfrm>
           <a:prstGeom prst="rect">
@@ -4546,7 +4547,7 @@
         </p:nvSpPr>
         <p:spPr>
           <a:xfrm>
-            <a:off x="7671188" y="2325498"/>
+            <a:off x="7638324" y="1995142"/>
             <a:ext cx="778162" cy="369332"/>
           </a:xfrm>
           <a:prstGeom prst="rect">
@@ -4582,7 +4583,7 @@
         </p:nvSpPr>
         <p:spPr>
           <a:xfrm>
-            <a:off x="7679249" y="3339154"/>
+            <a:off x="7667289" y="2679034"/>
             <a:ext cx="697948" cy="369332"/>
           </a:xfrm>
           <a:prstGeom prst="rect">
@@ -4601,6 +4602,207 @@
               <a:t>Temp</a:t>
             </a:r>
             <a:endParaRPr lang="en-GB" dirty="0"/>
+          </a:p>
+        </p:txBody>
+      </p:sp>
+      <p:sp>
+        <p:nvSpPr>
+          <p:cNvPr id="28" name="Rectangle 45">
+            <a:extLst>
+              <a:ext uri="{FF2B5EF4-FFF2-40B4-BE49-F238E27FC236}">
+                <a16:creationId xmlns:a16="http://schemas.microsoft.com/office/drawing/2014/main" id="{709E7300-A2E8-8244-A5C0-92760F619CE2}"/>
+              </a:ext>
+            </a:extLst>
+          </p:cNvPr>
+          <p:cNvSpPr/>
+          <p:nvPr/>
+        </p:nvSpPr>
+        <p:spPr>
+          <a:xfrm>
+            <a:off x="4998159" y="3530835"/>
+            <a:ext cx="1822057" cy="581856"/>
+          </a:xfrm>
+          <a:prstGeom prst="roundRect">
+            <a:avLst/>
+          </a:prstGeom>
+          <a:solidFill>
+            <a:schemeClr val="accent2">
+              <a:lumMod val="75000"/>
+            </a:schemeClr>
+          </a:solidFill>
+          <a:ln w="19050">
+            <a:noFill/>
+          </a:ln>
+          <a:effectLst/>
+        </p:spPr>
+        <p:style>
+          <a:lnRef idx="1">
+            <a:schemeClr val="accent5"/>
+          </a:lnRef>
+          <a:fillRef idx="2">
+            <a:schemeClr val="accent5"/>
+          </a:fillRef>
+          <a:effectRef idx="1">
+            <a:schemeClr val="accent5"/>
+          </a:effectRef>
+          <a:fontRef idx="minor">
+            <a:schemeClr val="dk1"/>
+          </a:fontRef>
+        </p:style>
+        <p:txBody>
+          <a:bodyPr rtlCol="0" anchor="ctr"/>
+          <a:lstStyle/>
+          <a:p>
+            <a:pPr algn="ctr"/>
+            <a:r>
+              <a:rPr lang="en-US" sz="1600" dirty="0" err="1">
+                <a:solidFill>
+                  <a:schemeClr val="bg1"/>
+                </a:solidFill>
+              </a:rPr>
+              <a:t>TransformationSet</a:t>
+            </a:r>
+            <a:endParaRPr lang="en-SG" sz="1600" dirty="0">
+              <a:solidFill>
+                <a:schemeClr val="bg1"/>
+              </a:solidFill>
+            </a:endParaRPr>
+          </a:p>
+        </p:txBody>
+      </p:sp>
+      <p:cxnSp>
+        <p:nvCxnSpPr>
+          <p:cNvPr id="30" name="Straight Arrow Connector 29">
+            <a:extLst>
+              <a:ext uri="{FF2B5EF4-FFF2-40B4-BE49-F238E27FC236}">
+                <a16:creationId xmlns:a16="http://schemas.microsoft.com/office/drawing/2014/main" id="{DA76169C-DA3C-294A-9921-B02972195220}"/>
+              </a:ext>
+            </a:extLst>
+          </p:cNvPr>
+          <p:cNvCxnSpPr>
+            <a:cxnSpLocks/>
+          </p:cNvCxnSpPr>
+          <p:nvPr/>
+        </p:nvCxnSpPr>
+        <p:spPr>
+          <a:xfrm>
+            <a:off x="4307490" y="3331396"/>
+            <a:ext cx="679895" cy="436158"/>
+          </a:xfrm>
+          <a:prstGeom prst="straightConnector1">
+            <a:avLst/>
+          </a:prstGeom>
+          <a:ln w="28575">
+            <a:solidFill>
+              <a:srgbClr val="0070C0"/>
+            </a:solidFill>
+            <a:tailEnd type="arrow"/>
+          </a:ln>
+        </p:spPr>
+        <p:style>
+          <a:lnRef idx="1">
+            <a:schemeClr val="accent1"/>
+          </a:lnRef>
+          <a:fillRef idx="0">
+            <a:schemeClr val="accent1"/>
+          </a:fillRef>
+          <a:effectRef idx="0">
+            <a:schemeClr val="accent1"/>
+          </a:effectRef>
+          <a:fontRef idx="minor">
+            <a:schemeClr val="tx1"/>
+          </a:fontRef>
+        </p:style>
+      </p:cxnSp>
+      <p:sp>
+        <p:nvSpPr>
+          <p:cNvPr id="33" name="Rectangle 45">
+            <a:extLst>
+              <a:ext uri="{FF2B5EF4-FFF2-40B4-BE49-F238E27FC236}">
+                <a16:creationId xmlns:a16="http://schemas.microsoft.com/office/drawing/2014/main" id="{23132D9A-01D4-9345-AF02-A13F9BEE41C6}"/>
+              </a:ext>
+            </a:extLst>
+          </p:cNvPr>
+          <p:cNvSpPr/>
+          <p:nvPr/>
+        </p:nvSpPr>
+        <p:spPr>
+          <a:xfrm>
+            <a:off x="4745090" y="2057400"/>
+            <a:ext cx="2239542" cy="2278864"/>
+          </a:xfrm>
+          <a:prstGeom prst="roundRect">
+            <a:avLst/>
+          </a:prstGeom>
+          <a:noFill/>
+          <a:ln w="19050">
+            <a:solidFill>
+              <a:schemeClr val="tx1"/>
+            </a:solidFill>
+            <a:prstDash val="dash"/>
+          </a:ln>
+          <a:effectLst/>
+        </p:spPr>
+        <p:style>
+          <a:lnRef idx="1">
+            <a:schemeClr val="accent5"/>
+          </a:lnRef>
+          <a:fillRef idx="2">
+            <a:schemeClr val="accent5"/>
+          </a:fillRef>
+          <a:effectRef idx="1">
+            <a:schemeClr val="accent5"/>
+          </a:effectRef>
+          <a:fontRef idx="minor">
+            <a:schemeClr val="dk1"/>
+          </a:fontRef>
+        </p:style>
+        <p:txBody>
+          <a:bodyPr rtlCol="0" anchor="ctr"/>
+          <a:lstStyle/>
+          <a:p>
+            <a:pPr algn="ctr"/>
+            <a:endParaRPr lang="en-SG" sz="1600" dirty="0">
+              <a:solidFill>
+                <a:schemeClr val="bg1"/>
+              </a:solidFill>
+            </a:endParaRPr>
+          </a:p>
+        </p:txBody>
+      </p:sp>
+      <p:sp>
+        <p:nvSpPr>
+          <p:cNvPr id="34" name="TextBox 33">
+            <a:extLst>
+              <a:ext uri="{FF2B5EF4-FFF2-40B4-BE49-F238E27FC236}">
+                <a16:creationId xmlns:a16="http://schemas.microsoft.com/office/drawing/2014/main" id="{792FDF3F-5F0A-3B42-A1C8-A13C68CAC798}"/>
+              </a:ext>
+            </a:extLst>
+          </p:cNvPr>
+          <p:cNvSpPr txBox="1"/>
+          <p:nvPr/>
+        </p:nvSpPr>
+        <p:spPr>
+          <a:xfrm>
+            <a:off x="5452221" y="1718846"/>
+            <a:ext cx="793807" cy="338554"/>
+          </a:xfrm>
+          <a:prstGeom prst="rect">
+            <a:avLst/>
+          </a:prstGeom>
+          <a:noFill/>
+        </p:spPr>
+        <p:txBody>
+          <a:bodyPr wrap="square" rtlCol="0">
+            <a:spAutoFit/>
+          </a:bodyPr>
+          <a:lstStyle/>
+          <a:p>
+            <a:r>
+              <a:rPr lang="en-SG" sz="1600" dirty="0"/>
+              <a:t>Model</a:t>
+            </a:r>
+            <a:endParaRPr lang="en-GB" sz="1600" dirty="0"/>
           </a:p>
         </p:txBody>
       </p:sp>

</xml_diff>